<commit_message>
Fixing Kmeans and updating Arc Project.
</commit_message>
<xml_diff>
--- a/project3/reports/WLoganDowning_P3.pptx
+++ b/project3/reports/WLoganDowning_P3.pptx
@@ -5,10 +5,10 @@
     <p:sldMasterId id="2147483732" r:id="rId97"/>
   </p:sldMasterIdLst>
   <p:notesMasterIdLst>
-    <p:notesMasterId r:id="rId111"/>
+    <p:notesMasterId r:id="rId112"/>
   </p:notesMasterIdLst>
   <p:handoutMasterIdLst>
-    <p:handoutMasterId r:id="rId112"/>
+    <p:handoutMasterId r:id="rId113"/>
   </p:handoutMasterIdLst>
   <p:sldIdLst>
     <p:sldId id="1017" r:id="rId98"/>
@@ -22,8 +22,9 @@
     <p:sldId id="1027" r:id="rId106"/>
     <p:sldId id="1025" r:id="rId107"/>
     <p:sldId id="1028" r:id="rId108"/>
-    <p:sldId id="1029" r:id="rId109"/>
-    <p:sldId id="1021" r:id="rId110"/>
+    <p:sldId id="1030" r:id="rId109"/>
+    <p:sldId id="1029" r:id="rId110"/>
+    <p:sldId id="1021" r:id="rId111"/>
   </p:sldIdLst>
   <p:sldSz cx="12192000" cy="6858000"/>
   <p:notesSz cx="6858000" cy="9144000"/>
@@ -226,7 +227,7 @@
           <a:p>
             <a:fld id="{72B617FF-D253-46EA-A674-D139BFD0F6F0}" type="datetimeFigureOut">
               <a:rPr lang="en-US" smtClean="0"/>
-              <a:t>10/1/2019</a:t>
+              <a:t>10/4/2019</a:t>
             </a:fld>
             <a:endParaRPr lang="en-US"/>
           </a:p>
@@ -392,7 +393,7 @@
           <a:p>
             <a:fld id="{52BB20DD-C290-41F2-B582-9D9B3D08D648}" type="datetimeFigureOut">
               <a:rPr lang="en-US" smtClean="0"/>
-              <a:t>10/1/2019</a:t>
+              <a:t>10/4/2019</a:t>
             </a:fld>
             <a:endParaRPr lang="en-US"/>
           </a:p>
@@ -3956,10 +3957,10 @@
       </p:sp>
       <p:pic>
         <p:nvPicPr>
-          <p:cNvPr id="4" name="Picture 3">
+          <p:cNvPr id="5" name="Picture 4">
             <a:extLst>
               <a:ext uri="{FF2B5EF4-FFF2-40B4-BE49-F238E27FC236}">
-                <a16:creationId xmlns:a16="http://schemas.microsoft.com/office/drawing/2014/main" id="{9760E5DA-7249-494E-8DBC-C37D6B9686B8}"/>
+                <a16:creationId xmlns:a16="http://schemas.microsoft.com/office/drawing/2014/main" id="{0186E9B1-E7A7-456F-B912-36DB16508152}"/>
               </a:ext>
             </a:extLst>
           </p:cNvPr>
@@ -3976,8 +3977,8 @@
         </p:blipFill>
         <p:spPr>
           <a:xfrm>
-            <a:off x="1988464" y="1177589"/>
-            <a:ext cx="8215072" cy="5342083"/>
+            <a:off x="1938930" y="1200839"/>
+            <a:ext cx="8314140" cy="4892464"/>
           </a:xfrm>
           <a:prstGeom prst="rect">
             <a:avLst/>
@@ -4056,10 +4057,10 @@
       </p:sp>
       <p:pic>
         <p:nvPicPr>
-          <p:cNvPr id="5" name="Picture 4">
+          <p:cNvPr id="2" name="Picture 1">
             <a:extLst>
               <a:ext uri="{FF2B5EF4-FFF2-40B4-BE49-F238E27FC236}">
-                <a16:creationId xmlns:a16="http://schemas.microsoft.com/office/drawing/2014/main" id="{0706F536-D830-486A-84F0-AAB68F2D63F8}"/>
+                <a16:creationId xmlns:a16="http://schemas.microsoft.com/office/drawing/2014/main" id="{29E99825-7627-4F78-983A-52C1E7D1ECDB}"/>
               </a:ext>
             </a:extLst>
           </p:cNvPr>
@@ -4076,8 +4077,8 @@
         </p:blipFill>
         <p:spPr>
           <a:xfrm>
-            <a:off x="2243756" y="1106120"/>
-            <a:ext cx="7704488" cy="5220152"/>
+            <a:off x="228092" y="1028986"/>
+            <a:ext cx="5867908" cy="4221846"/>
           </a:xfrm>
           <a:prstGeom prst="rect">
             <a:avLst/>
@@ -4094,58 +4095,46 @@
           </a:effectLst>
         </p:spPr>
       </p:pic>
-      <p:sp>
-        <p:nvSpPr>
-          <p:cNvPr id="6" name="Oval 5">
+      <p:pic>
+        <p:nvPicPr>
+          <p:cNvPr id="4" name="Picture 3">
             <a:extLst>
               <a:ext uri="{FF2B5EF4-FFF2-40B4-BE49-F238E27FC236}">
-                <a16:creationId xmlns:a16="http://schemas.microsoft.com/office/drawing/2014/main" id="{E9A0FE3B-69A6-40A8-8F97-A3745C5125CE}"/>
+                <a16:creationId xmlns:a16="http://schemas.microsoft.com/office/drawing/2014/main" id="{2830805F-5ACC-4C28-8627-B215C5CA5C25}"/>
               </a:ext>
             </a:extLst>
           </p:cNvPr>
-          <p:cNvSpPr/>
+          <p:cNvPicPr>
+            <a:picLocks noChangeAspect="1"/>
+          </p:cNvPicPr>
           <p:nvPr/>
-        </p:nvSpPr>
+        </p:nvPicPr>
+        <p:blipFill>
+          <a:blip r:embed="rId3"/>
+          <a:stretch>
+            <a:fillRect/>
+          </a:stretch>
+        </p:blipFill>
         <p:spPr>
           <a:xfrm>
-            <a:off x="1429967" y="5751880"/>
-            <a:ext cx="9114818" cy="767792"/>
+            <a:off x="3543078" y="3981992"/>
+            <a:ext cx="8420830" cy="2537680"/>
           </a:xfrm>
-          <a:prstGeom prst="ellipse">
+          <a:prstGeom prst="rect">
             <a:avLst/>
           </a:prstGeom>
-          <a:noFill/>
           <a:ln>
-            <a:solidFill>
-              <a:srgbClr val="FF0000"/>
-            </a:solidFill>
+            <a:noFill/>
           </a:ln>
+          <a:effectLst>
+            <a:outerShdw blurRad="190500" algn="tl" rotWithShape="0">
+              <a:srgbClr val="000000">
+                <a:alpha val="70000"/>
+              </a:srgbClr>
+            </a:outerShdw>
+          </a:effectLst>
         </p:spPr>
-        <p:style>
-          <a:lnRef idx="2">
-            <a:schemeClr val="accent1">
-              <a:shade val="50000"/>
-            </a:schemeClr>
-          </a:lnRef>
-          <a:fillRef idx="1">
-            <a:schemeClr val="accent1"/>
-          </a:fillRef>
-          <a:effectRef idx="0">
-            <a:schemeClr val="accent1"/>
-          </a:effectRef>
-          <a:fontRef idx="minor">
-            <a:schemeClr val="lt1"/>
-          </a:fontRef>
-        </p:style>
-        <p:txBody>
-          <a:bodyPr rtlCol="0" anchor="ctr"/>
-          <a:lstStyle/>
-          <a:p>
-            <a:pPr algn="ctr"/>
-            <a:endParaRPr lang="en-US"/>
-          </a:p>
-        </p:txBody>
-      </p:sp>
+      </p:pic>
     </p:spTree>
     <p:extLst>
       <p:ext uri="{BB962C8B-B14F-4D97-AF65-F5344CB8AC3E}">
@@ -4208,10 +4197,110 @@
       </p:sp>
       <p:pic>
         <p:nvPicPr>
-          <p:cNvPr id="5" name="Picture 4">
+          <p:cNvPr id="4" name="Picture 3">
             <a:extLst>
               <a:ext uri="{FF2B5EF4-FFF2-40B4-BE49-F238E27FC236}">
-                <a16:creationId xmlns:a16="http://schemas.microsoft.com/office/drawing/2014/main" id="{EAD9054F-6D56-4057-80A7-8EC67E0B5076}"/>
+                <a16:creationId xmlns:a16="http://schemas.microsoft.com/office/drawing/2014/main" id="{5436CA17-BB89-43FE-A91F-7CEEA07F7A10}"/>
+              </a:ext>
+            </a:extLst>
+          </p:cNvPr>
+          <p:cNvPicPr>
+            <a:picLocks noChangeAspect="1"/>
+          </p:cNvPicPr>
+          <p:nvPr/>
+        </p:nvPicPr>
+        <p:blipFill>
+          <a:blip r:embed="rId2"/>
+          <a:stretch>
+            <a:fillRect/>
+          </a:stretch>
+        </p:blipFill>
+        <p:spPr>
+          <a:xfrm>
+            <a:off x="1919878" y="2407831"/>
+            <a:ext cx="8352244" cy="2042337"/>
+          </a:xfrm>
+          <a:prstGeom prst="rect">
+            <a:avLst/>
+          </a:prstGeom>
+          <a:ln>
+            <a:noFill/>
+          </a:ln>
+          <a:effectLst>
+            <a:outerShdw blurRad="190500" algn="tl" rotWithShape="0">
+              <a:srgbClr val="000000">
+                <a:alpha val="70000"/>
+              </a:srgbClr>
+            </a:outerShdw>
+          </a:effectLst>
+        </p:spPr>
+      </p:pic>
+    </p:spTree>
+    <p:extLst>
+      <p:ext uri="{BB962C8B-B14F-4D97-AF65-F5344CB8AC3E}">
+        <p14:creationId xmlns:p14="http://schemas.microsoft.com/office/powerpoint/2010/main" val="4010775035"/>
+      </p:ext>
+    </p:extLst>
+  </p:cSld>
+  <p:clrMapOvr>
+    <a:masterClrMapping/>
+  </p:clrMapOvr>
+</p:sld>
+</file>
+
+<file path=ppt/slides/slide13.xml><?xml version="1.0" encoding="utf-8"?>
+<p:sld xmlns:a="http://schemas.openxmlformats.org/drawingml/2006/main" xmlns:r="http://schemas.openxmlformats.org/officeDocument/2006/relationships" xmlns:p="http://schemas.openxmlformats.org/presentationml/2006/main">
+  <p:cSld>
+    <p:spTree>
+      <p:nvGrpSpPr>
+        <p:cNvPr id="1" name=""/>
+        <p:cNvGrpSpPr/>
+        <p:nvPr/>
+      </p:nvGrpSpPr>
+      <p:grpSpPr>
+        <a:xfrm>
+          <a:off x="0" y="0"/>
+          <a:ext cx="0" cy="0"/>
+          <a:chOff x="0" y="0"/>
+          <a:chExt cx="0" cy="0"/>
+        </a:xfrm>
+      </p:grpSpPr>
+      <p:sp>
+        <p:nvSpPr>
+          <p:cNvPr id="3" name="Title 2"/>
+          <p:cNvSpPr>
+            <a:spLocks noGrp="1"/>
+          </p:cNvSpPr>
+          <p:nvPr>
+            <p:ph type="title"/>
+          </p:nvPr>
+        </p:nvSpPr>
+        <p:spPr/>
+        <p:txBody>
+          <a:bodyPr/>
+          <a:lstStyle/>
+          <a:p>
+            <a:r>
+              <a:rPr lang="en-US" dirty="0"/>
+              <a:t>Developing a </a:t>
+            </a:r>
+            <a:r>
+              <a:rPr lang="en-US" dirty="0" err="1"/>
+              <a:t>Kmeans</a:t>
+            </a:r>
+            <a:r>
+              <a:rPr lang="en-US" dirty="0"/>
+              <a:t> Clustering Algorithm</a:t>
+            </a:r>
+          </a:p>
+        </p:txBody>
+      </p:sp>
+      <p:pic>
+        <p:nvPicPr>
+          <p:cNvPr id="4" name="Picture 3">
+            <a:extLst>
+              <a:ext uri="{FF2B5EF4-FFF2-40B4-BE49-F238E27FC236}">
+                <a16:creationId xmlns:a16="http://schemas.microsoft.com/office/drawing/2014/main" id="{47E14CFB-7707-411E-BA46-79B8123C3295}"/>
               </a:ext>
             </a:extLst>
           </p:cNvPr>
@@ -4234,7 +4323,7 @@
         </p:blipFill>
         <p:spPr>
           <a:xfrm>
-            <a:off x="5569434" y="1200839"/>
+            <a:off x="5590161" y="1199420"/>
             <a:ext cx="5189706" cy="5189706"/>
           </a:xfrm>
           <a:prstGeom prst="rect">
@@ -4254,10 +4343,10 @@
       </p:pic>
       <p:pic>
         <p:nvPicPr>
-          <p:cNvPr id="7" name="Picture 6">
+          <p:cNvPr id="8" name="Picture 7">
             <a:extLst>
               <a:ext uri="{FF2B5EF4-FFF2-40B4-BE49-F238E27FC236}">
-                <a16:creationId xmlns:a16="http://schemas.microsoft.com/office/drawing/2014/main" id="{A83E5E82-8E10-41E6-BC4D-92E0A9F0C922}"/>
+                <a16:creationId xmlns:a16="http://schemas.microsoft.com/office/drawing/2014/main" id="{34D13426-97B0-46D7-8449-928648CEB2E5}"/>
               </a:ext>
             </a:extLst>
           </p:cNvPr>
@@ -4274,13 +4363,13 @@
               </a:ext>
             </a:extLst>
           </a:blip>
-          <a:srcRect r="50095"/>
+          <a:srcRect r="49748"/>
           <a:stretch/>
         </p:blipFill>
         <p:spPr>
           <a:xfrm>
-            <a:off x="1432860" y="1200839"/>
-            <a:ext cx="3388252" cy="5189707"/>
+            <a:off x="1412133" y="1199420"/>
+            <a:ext cx="3412787" cy="5191125"/>
           </a:xfrm>
           <a:prstGeom prst="rect">
             <a:avLst/>
@@ -4310,7 +4399,7 @@
 </p:sld>
 </file>
 
-<file path=ppt/slides/slide13.xml><?xml version="1.0" encoding="utf-8"?>
+<file path=ppt/slides/slide14.xml><?xml version="1.0" encoding="utf-8"?>
 <p:sld xmlns:a="http://schemas.openxmlformats.org/drawingml/2006/main" xmlns:r="http://schemas.openxmlformats.org/officeDocument/2006/relationships" xmlns:p="http://schemas.openxmlformats.org/presentationml/2006/main">
   <p:cSld>
     <p:spTree>
@@ -4327,6 +4416,42 @@
           <a:chExt cx="0" cy="0"/>
         </a:xfrm>
       </p:grpSpPr>
+      <p:pic>
+        <p:nvPicPr>
+          <p:cNvPr id="7" name="Picture 6">
+            <a:extLst>
+              <a:ext uri="{FF2B5EF4-FFF2-40B4-BE49-F238E27FC236}">
+                <a16:creationId xmlns:a16="http://schemas.microsoft.com/office/drawing/2014/main" id="{B2D51837-EAC8-4614-85FB-450D8289F273}"/>
+              </a:ext>
+            </a:extLst>
+          </p:cNvPr>
+          <p:cNvPicPr>
+            <a:picLocks noChangeAspect="1"/>
+          </p:cNvPicPr>
+          <p:nvPr/>
+        </p:nvPicPr>
+        <p:blipFill>
+          <a:blip r:embed="rId2">
+            <a:extLst>
+              <a:ext uri="{28A0092B-C50C-407E-A947-70E740481C1C}">
+                <a14:useLocalDpi xmlns:a14="http://schemas.microsoft.com/office/drawing/2010/main" val="0"/>
+              </a:ext>
+            </a:extLst>
+          </a:blip>
+          <a:stretch>
+            <a:fillRect/>
+          </a:stretch>
+        </p:blipFill>
+        <p:spPr>
+          <a:xfrm>
+            <a:off x="6491334" y="1274719"/>
+            <a:ext cx="4967850" cy="4967850"/>
+          </a:xfrm>
+          <a:prstGeom prst="rect">
+            <a:avLst/>
+          </a:prstGeom>
+        </p:spPr>
+      </p:pic>
       <p:sp>
         <p:nvSpPr>
           <p:cNvPr id="3" name="Title 2"/>
@@ -4372,7 +4497,7 @@
           <p:nvPr/>
         </p:nvPicPr>
         <p:blipFill rotWithShape="1">
-          <a:blip r:embed="rId2">
+          <a:blip r:embed="rId3">
             <a:extLst>
               <a:ext uri="{28A0092B-C50C-407E-A947-70E740481C1C}">
                 <a14:useLocalDpi xmlns:a14="http://schemas.microsoft.com/office/drawing/2010/main" val="0"/>
@@ -4402,52 +4527,45 @@
           </a:effectLst>
         </p:spPr>
       </p:pic>
-      <p:pic>
-        <p:nvPicPr>
-          <p:cNvPr id="6" name="Picture 5">
+      <p:sp>
+        <p:nvSpPr>
+          <p:cNvPr id="2" name="TextBox 1">
             <a:extLst>
               <a:ext uri="{FF2B5EF4-FFF2-40B4-BE49-F238E27FC236}">
-                <a16:creationId xmlns:a16="http://schemas.microsoft.com/office/drawing/2014/main" id="{A0053977-CD35-49B8-841C-E3D2E5A6476D}"/>
+                <a16:creationId xmlns:a16="http://schemas.microsoft.com/office/drawing/2014/main" id="{3C58901C-158D-4420-A88E-7F444845249D}"/>
               </a:ext>
             </a:extLst>
           </p:cNvPr>
-          <p:cNvPicPr>
-            <a:picLocks noChangeAspect="1"/>
-          </p:cNvPicPr>
+          <p:cNvSpPr txBox="1"/>
           <p:nvPr/>
-        </p:nvPicPr>
-        <p:blipFill>
-          <a:blip r:embed="rId3">
-            <a:extLst>
-              <a:ext uri="{28A0092B-C50C-407E-A947-70E740481C1C}">
-                <a14:useLocalDpi xmlns:a14="http://schemas.microsoft.com/office/drawing/2010/main" val="0"/>
-              </a:ext>
-            </a:extLst>
-          </a:blip>
-          <a:stretch>
-            <a:fillRect/>
-          </a:stretch>
-        </p:blipFill>
+        </p:nvSpPr>
         <p:spPr>
           <a:xfrm>
-            <a:off x="5569434" y="1200839"/>
-            <a:ext cx="5189706" cy="5189706"/>
+            <a:off x="1926076" y="3103123"/>
+            <a:ext cx="9912485" cy="830997"/>
           </a:xfrm>
           <a:prstGeom prst="rect">
             <a:avLst/>
           </a:prstGeom>
-          <a:ln>
-            <a:noFill/>
-          </a:ln>
-          <a:effectLst>
-            <a:outerShdw blurRad="190500" algn="tl" rotWithShape="0">
-              <a:srgbClr val="000000">
-                <a:alpha val="70000"/>
-              </a:srgbClr>
-            </a:outerShdw>
-          </a:effectLst>
+          <a:noFill/>
         </p:spPr>
-      </p:pic>
+        <p:txBody>
+          <a:bodyPr wrap="square" rtlCol="0">
+            <a:spAutoFit/>
+          </a:bodyPr>
+          <a:lstStyle/>
+          <a:p>
+            <a:r>
+              <a:rPr lang="en-US" sz="4800" dirty="0">
+                <a:solidFill>
+                  <a:srgbClr val="FF0000"/>
+                </a:solidFill>
+              </a:rPr>
+              <a:t>NEED TO UPDATE THIS SLIDE!</a:t>
+            </a:r>
+          </a:p>
+        </p:txBody>
+      </p:sp>
     </p:spTree>
     <p:extLst>
       <p:ext uri="{BB962C8B-B14F-4D97-AF65-F5344CB8AC3E}">
@@ -5221,10 +5339,10 @@
       </p:grpSpPr>
       <p:pic>
         <p:nvPicPr>
-          <p:cNvPr id="5" name="Picture 4">
+          <p:cNvPr id="3" name="Picture 2">
             <a:extLst>
               <a:ext uri="{FF2B5EF4-FFF2-40B4-BE49-F238E27FC236}">
-                <a16:creationId xmlns:a16="http://schemas.microsoft.com/office/drawing/2014/main" id="{24CFAE7D-E086-45CC-94E7-EEFEF779041D}"/>
+                <a16:creationId xmlns:a16="http://schemas.microsoft.com/office/drawing/2014/main" id="{8AD48DDE-9587-43A1-9A28-B4F39B7CFAEA}"/>
               </a:ext>
             </a:extLst>
           </p:cNvPr>
@@ -5297,10 +5415,10 @@
       </p:grpSpPr>
       <p:pic>
         <p:nvPicPr>
-          <p:cNvPr id="7" name="Picture 6">
+          <p:cNvPr id="3" name="Picture 2">
             <a:extLst>
               <a:ext uri="{FF2B5EF4-FFF2-40B4-BE49-F238E27FC236}">
-                <a16:creationId xmlns:a16="http://schemas.microsoft.com/office/drawing/2014/main" id="{D2CD49F1-5D30-420A-8C28-9F87AAC52ABC}"/>
+                <a16:creationId xmlns:a16="http://schemas.microsoft.com/office/drawing/2014/main" id="{28DA263E-4137-4336-9B5C-A413A3E62813}"/>
               </a:ext>
             </a:extLst>
           </p:cNvPr>
@@ -5373,10 +5491,10 @@
       </p:grpSpPr>
       <p:pic>
         <p:nvPicPr>
-          <p:cNvPr id="3" name="Picture 2">
+          <p:cNvPr id="4" name="Picture 3">
             <a:extLst>
               <a:ext uri="{FF2B5EF4-FFF2-40B4-BE49-F238E27FC236}">
-                <a16:creationId xmlns:a16="http://schemas.microsoft.com/office/drawing/2014/main" id="{BC3E5456-F2B4-4534-AEA2-F54DB46EAC5F}"/>
+                <a16:creationId xmlns:a16="http://schemas.microsoft.com/office/drawing/2014/main" id="{D0CDB19B-F648-451B-8A21-1916044342BE}"/>
               </a:ext>
             </a:extLst>
           </p:cNvPr>
@@ -6924,6 +7042,566 @@
 </file>
 
 <file path=customXml/itemProps1.xml><?xml version="1.0" encoding="utf-8"?>
+<ds:datastoreItem xmlns:ds="http://schemas.openxmlformats.org/officeDocument/2006/customXml" ds:itemID="{0AEA82C0-ED10-42A7-944B-5E3E18581F28}">
+  <ds:schemaRefs>
+    <ds:schemaRef ds:uri="ESRI.ArcGIS.Mapping.OfficeIntegration.PowerPointInfo"/>
+  </ds:schemaRefs>
+</ds:datastoreItem>
+</file>
+
+<file path=customXml/itemProps10.xml><?xml version="1.0" encoding="utf-8"?>
+<ds:datastoreItem xmlns:ds="http://schemas.openxmlformats.org/officeDocument/2006/customXml" ds:itemID="{32B3076B-EAE5-453F-81FC-455E4631880A}">
+  <ds:schemaRefs>
+    <ds:schemaRef ds:uri="ESRI.ArcGIS.Mapping.OfficeIntegration.PowerPointInfo"/>
+  </ds:schemaRefs>
+</ds:datastoreItem>
+</file>
+
+<file path=customXml/itemProps11.xml><?xml version="1.0" encoding="utf-8"?>
+<ds:datastoreItem xmlns:ds="http://schemas.openxmlformats.org/officeDocument/2006/customXml" ds:itemID="{8DC6FF56-73FA-4910-907B-F59E8164B000}">
+  <ds:schemaRefs>
+    <ds:schemaRef ds:uri="ESRI.ArcGIS.Mapping.OfficeIntegration.PowerPointInfo"/>
+  </ds:schemaRefs>
+</ds:datastoreItem>
+</file>
+
+<file path=customXml/itemProps12.xml><?xml version="1.0" encoding="utf-8"?>
+<ds:datastoreItem xmlns:ds="http://schemas.openxmlformats.org/officeDocument/2006/customXml" ds:itemID="{2B63EAEA-ACD7-4ABA-A376-4D8FE1692226}">
+  <ds:schemaRefs>
+    <ds:schemaRef ds:uri="ESRI.ArcGIS.Mapping.OfficeIntegration.PowerPointInfo"/>
+  </ds:schemaRefs>
+</ds:datastoreItem>
+</file>
+
+<file path=customXml/itemProps13.xml><?xml version="1.0" encoding="utf-8"?>
+<ds:datastoreItem xmlns:ds="http://schemas.openxmlformats.org/officeDocument/2006/customXml" ds:itemID="{B4B3F56B-6212-4E4E-A69C-BAD9370C4D6C}">
+  <ds:schemaRefs>
+    <ds:schemaRef ds:uri="ESRI.ArcGIS.Mapping.OfficeIntegration.PowerPointInfo"/>
+  </ds:schemaRefs>
+</ds:datastoreItem>
+</file>
+
+<file path=customXml/itemProps14.xml><?xml version="1.0" encoding="utf-8"?>
+<ds:datastoreItem xmlns:ds="http://schemas.openxmlformats.org/officeDocument/2006/customXml" ds:itemID="{0BBCE46F-CB8D-4F8F-ADD9-7F362D1D91C6}">
+  <ds:schemaRefs>
+    <ds:schemaRef ds:uri="ESRI.ArcGIS.Mapping.OfficeIntegration.PowerPointInfo"/>
+  </ds:schemaRefs>
+</ds:datastoreItem>
+</file>
+
+<file path=customXml/itemProps15.xml><?xml version="1.0" encoding="utf-8"?>
+<ds:datastoreItem xmlns:ds="http://schemas.openxmlformats.org/officeDocument/2006/customXml" ds:itemID="{EDD90020-1C1C-4DCB-8543-69D77F7C08FB}">
+  <ds:schemaRefs>
+    <ds:schemaRef ds:uri="ESRI.ArcGIS.Mapping.OfficeIntegration.PowerPointInfo"/>
+  </ds:schemaRefs>
+</ds:datastoreItem>
+</file>
+
+<file path=customXml/itemProps16.xml><?xml version="1.0" encoding="utf-8"?>
+<ds:datastoreItem xmlns:ds="http://schemas.openxmlformats.org/officeDocument/2006/customXml" ds:itemID="{9F3F1C5C-7B45-487C-9DC2-3C73D2F709E7}">
+  <ds:schemaRefs>
+    <ds:schemaRef ds:uri="ESRI.ArcGIS.Mapping.OfficeIntegration.PowerPointInfo"/>
+  </ds:schemaRefs>
+</ds:datastoreItem>
+</file>
+
+<file path=customXml/itemProps17.xml><?xml version="1.0" encoding="utf-8"?>
+<ds:datastoreItem xmlns:ds="http://schemas.openxmlformats.org/officeDocument/2006/customXml" ds:itemID="{3B04F669-128B-4BDF-96F1-E5081EC03298}">
+  <ds:schemaRefs>
+    <ds:schemaRef ds:uri="ESRI.ArcGIS.Mapping.OfficeIntegration.PowerPointInfo"/>
+  </ds:schemaRefs>
+</ds:datastoreItem>
+</file>
+
+<file path=customXml/itemProps18.xml><?xml version="1.0" encoding="utf-8"?>
+<ds:datastoreItem xmlns:ds="http://schemas.openxmlformats.org/officeDocument/2006/customXml" ds:itemID="{DE0B804D-D3DA-41B8-A868-49FAF87763E2}">
+  <ds:schemaRefs>
+    <ds:schemaRef ds:uri="ESRI.ArcGIS.Mapping.OfficeIntegration.PowerPointInfo"/>
+  </ds:schemaRefs>
+</ds:datastoreItem>
+</file>
+
+<file path=customXml/itemProps19.xml><?xml version="1.0" encoding="utf-8"?>
+<ds:datastoreItem xmlns:ds="http://schemas.openxmlformats.org/officeDocument/2006/customXml" ds:itemID="{0B1D3F49-B805-42B7-B826-4C796D9E3E8A}">
+  <ds:schemaRefs>
+    <ds:schemaRef ds:uri="ESRI.ArcGIS.Mapping.OfficeIntegration.PowerPointInfo"/>
+  </ds:schemaRefs>
+</ds:datastoreItem>
+</file>
+
+<file path=customXml/itemProps2.xml><?xml version="1.0" encoding="utf-8"?>
+<ds:datastoreItem xmlns:ds="http://schemas.openxmlformats.org/officeDocument/2006/customXml" ds:itemID="{783692B3-F49B-48DF-A44F-01268B688908}">
+  <ds:schemaRefs>
+    <ds:schemaRef ds:uri="ESRI.ArcGIS.Mapping.OfficeIntegration.PowerPointInfo"/>
+  </ds:schemaRefs>
+</ds:datastoreItem>
+</file>
+
+<file path=customXml/itemProps20.xml><?xml version="1.0" encoding="utf-8"?>
+<ds:datastoreItem xmlns:ds="http://schemas.openxmlformats.org/officeDocument/2006/customXml" ds:itemID="{31297315-62C1-4480-9C39-121F7B077A81}">
+  <ds:schemaRefs>
+    <ds:schemaRef ds:uri="ESRI.ArcGIS.Mapping.OfficeIntegration.PowerPointInfo"/>
+  </ds:schemaRefs>
+</ds:datastoreItem>
+</file>
+
+<file path=customXml/itemProps21.xml><?xml version="1.0" encoding="utf-8"?>
+<ds:datastoreItem xmlns:ds="http://schemas.openxmlformats.org/officeDocument/2006/customXml" ds:itemID="{FFB4F6C3-1643-48A9-AE21-B5A1E8A4AEB0}">
+  <ds:schemaRefs>
+    <ds:schemaRef ds:uri="ESRI.ArcGIS.Mapping.OfficeIntegration.PowerPointInfo"/>
+  </ds:schemaRefs>
+</ds:datastoreItem>
+</file>
+
+<file path=customXml/itemProps22.xml><?xml version="1.0" encoding="utf-8"?>
+<ds:datastoreItem xmlns:ds="http://schemas.openxmlformats.org/officeDocument/2006/customXml" ds:itemID="{1F1BC2FE-0061-43E0-A06F-CBC8207133B9}">
+  <ds:schemaRefs>
+    <ds:schemaRef ds:uri="ESRI.ArcGIS.Mapping.OfficeIntegration.PowerPointInfo"/>
+  </ds:schemaRefs>
+</ds:datastoreItem>
+</file>
+
+<file path=customXml/itemProps23.xml><?xml version="1.0" encoding="utf-8"?>
+<ds:datastoreItem xmlns:ds="http://schemas.openxmlformats.org/officeDocument/2006/customXml" ds:itemID="{ABCCEAD0-54AC-4D17-BA61-16A54F255D69}">
+  <ds:schemaRefs>
+    <ds:schemaRef ds:uri="ESRI.ArcGIS.Mapping.OfficeIntegration.PowerPointInfo"/>
+  </ds:schemaRefs>
+</ds:datastoreItem>
+</file>
+
+<file path=customXml/itemProps24.xml><?xml version="1.0" encoding="utf-8"?>
+<ds:datastoreItem xmlns:ds="http://schemas.openxmlformats.org/officeDocument/2006/customXml" ds:itemID="{E97E5AC9-EB0E-4E17-82F5-29C257EEEB45}">
+  <ds:schemaRefs>
+    <ds:schemaRef ds:uri="ESRI.ArcGIS.Mapping.OfficeIntegration.PowerPointInfo"/>
+  </ds:schemaRefs>
+</ds:datastoreItem>
+</file>
+
+<file path=customXml/itemProps25.xml><?xml version="1.0" encoding="utf-8"?>
+<ds:datastoreItem xmlns:ds="http://schemas.openxmlformats.org/officeDocument/2006/customXml" ds:itemID="{FD6AF6B8-20AF-4256-AB02-C338175F1E0D}">
+  <ds:schemaRefs>
+    <ds:schemaRef ds:uri="ESRI.ArcGIS.Mapping.OfficeIntegration.PowerPointInfo"/>
+  </ds:schemaRefs>
+</ds:datastoreItem>
+</file>
+
+<file path=customXml/itemProps26.xml><?xml version="1.0" encoding="utf-8"?>
+<ds:datastoreItem xmlns:ds="http://schemas.openxmlformats.org/officeDocument/2006/customXml" ds:itemID="{76256A5F-5E77-404E-ACE6-E5F14B242FEF}">
+  <ds:schemaRefs>
+    <ds:schemaRef ds:uri="ESRI.ArcGIS.Mapping.OfficeIntegration.PowerPointInfo"/>
+  </ds:schemaRefs>
+</ds:datastoreItem>
+</file>
+
+<file path=customXml/itemProps27.xml><?xml version="1.0" encoding="utf-8"?>
+<ds:datastoreItem xmlns:ds="http://schemas.openxmlformats.org/officeDocument/2006/customXml" ds:itemID="{BC256338-B0F4-4B4C-ADA9-9050D1EE2A96}">
+  <ds:schemaRefs>
+    <ds:schemaRef ds:uri="ESRI.ArcGIS.Mapping.OfficeIntegration.PowerPointInfo"/>
+  </ds:schemaRefs>
+</ds:datastoreItem>
+</file>
+
+<file path=customXml/itemProps28.xml><?xml version="1.0" encoding="utf-8"?>
+<ds:datastoreItem xmlns:ds="http://schemas.openxmlformats.org/officeDocument/2006/customXml" ds:itemID="{9EF54B68-B7DB-4B00-82E6-5C5A8D64BD6D}">
+  <ds:schemaRefs>
+    <ds:schemaRef ds:uri="ESRI.ArcGIS.Mapping.OfficeIntegration.PowerPointInfo"/>
+  </ds:schemaRefs>
+</ds:datastoreItem>
+</file>
+
+<file path=customXml/itemProps29.xml><?xml version="1.0" encoding="utf-8"?>
+<ds:datastoreItem xmlns:ds="http://schemas.openxmlformats.org/officeDocument/2006/customXml" ds:itemID="{A7AB7DF8-F007-4556-A232-360A414ABD0F}">
+  <ds:schemaRefs>
+    <ds:schemaRef ds:uri="ESRI.ArcGIS.Mapping.OfficeIntegration.PowerPointInfo"/>
+  </ds:schemaRefs>
+</ds:datastoreItem>
+</file>
+
+<file path=customXml/itemProps3.xml><?xml version="1.0" encoding="utf-8"?>
+<ds:datastoreItem xmlns:ds="http://schemas.openxmlformats.org/officeDocument/2006/customXml" ds:itemID="{E215F23A-A7E3-44C9-87D9-A01E58570A86}">
+  <ds:schemaRefs>
+    <ds:schemaRef ds:uri="ESRI.ArcGIS.Mapping.OfficeIntegration.PowerPointInfo"/>
+  </ds:schemaRefs>
+</ds:datastoreItem>
+</file>
+
+<file path=customXml/itemProps30.xml><?xml version="1.0" encoding="utf-8"?>
+<ds:datastoreItem xmlns:ds="http://schemas.openxmlformats.org/officeDocument/2006/customXml" ds:itemID="{A62081BB-8EE0-4907-A77C-AA4385BFFB24}">
+  <ds:schemaRefs>
+    <ds:schemaRef ds:uri="ESRI.ArcGIS.Mapping.OfficeIntegration.PowerPointInfo"/>
+  </ds:schemaRefs>
+</ds:datastoreItem>
+</file>
+
+<file path=customXml/itemProps31.xml><?xml version="1.0" encoding="utf-8"?>
+<ds:datastoreItem xmlns:ds="http://schemas.openxmlformats.org/officeDocument/2006/customXml" ds:itemID="{E870EF71-F059-47A0-8084-ABCBA0F8957D}">
+  <ds:schemaRefs>
+    <ds:schemaRef ds:uri="ESRI.ArcGIS.Mapping.OfficeIntegration.PowerPointInfo"/>
+  </ds:schemaRefs>
+</ds:datastoreItem>
+</file>
+
+<file path=customXml/itemProps32.xml><?xml version="1.0" encoding="utf-8"?>
+<ds:datastoreItem xmlns:ds="http://schemas.openxmlformats.org/officeDocument/2006/customXml" ds:itemID="{99654EFC-576A-4551-A930-9AE30D2EFEBA}">
+  <ds:schemaRefs>
+    <ds:schemaRef ds:uri="ESRI.ArcGIS.Mapping.OfficeIntegration.PowerPointInfo"/>
+  </ds:schemaRefs>
+</ds:datastoreItem>
+</file>
+
+<file path=customXml/itemProps33.xml><?xml version="1.0" encoding="utf-8"?>
+<ds:datastoreItem xmlns:ds="http://schemas.openxmlformats.org/officeDocument/2006/customXml" ds:itemID="{B297B785-E6A8-4387-B4A9-E2724F4A130E}">
+  <ds:schemaRefs>
+    <ds:schemaRef ds:uri="ESRI.ArcGIS.Mapping.OfficeIntegration.PowerPointInfo"/>
+  </ds:schemaRefs>
+</ds:datastoreItem>
+</file>
+
+<file path=customXml/itemProps34.xml><?xml version="1.0" encoding="utf-8"?>
+<ds:datastoreItem xmlns:ds="http://schemas.openxmlformats.org/officeDocument/2006/customXml" ds:itemID="{A2682B7B-CB0F-45B9-913A-5D8C43E0FCBA}">
+  <ds:schemaRefs>
+    <ds:schemaRef ds:uri="ESRI.ArcGIS.Mapping.OfficeIntegration.PowerPointInfo"/>
+  </ds:schemaRefs>
+</ds:datastoreItem>
+</file>
+
+<file path=customXml/itemProps35.xml><?xml version="1.0" encoding="utf-8"?>
+<ds:datastoreItem xmlns:ds="http://schemas.openxmlformats.org/officeDocument/2006/customXml" ds:itemID="{8912BC99-414D-4FBF-A2E0-86F6F3C9B9C8}">
+  <ds:schemaRefs>
+    <ds:schemaRef ds:uri="ESRI.ArcGIS.Mapping.OfficeIntegration.PowerPointInfo"/>
+  </ds:schemaRefs>
+</ds:datastoreItem>
+</file>
+
+<file path=customXml/itemProps36.xml><?xml version="1.0" encoding="utf-8"?>
+<ds:datastoreItem xmlns:ds="http://schemas.openxmlformats.org/officeDocument/2006/customXml" ds:itemID="{EB87CEDC-8E2C-4C48-9DD3-9796D551280D}">
+  <ds:schemaRefs>
+    <ds:schemaRef ds:uri="ESRI.ArcGIS.Mapping.OfficeIntegration.PowerPointInfo"/>
+  </ds:schemaRefs>
+</ds:datastoreItem>
+</file>
+
+<file path=customXml/itemProps37.xml><?xml version="1.0" encoding="utf-8"?>
+<ds:datastoreItem xmlns:ds="http://schemas.openxmlformats.org/officeDocument/2006/customXml" ds:itemID="{35CCF644-4BDF-4974-8CF2-2D51276EE878}">
+  <ds:schemaRefs>
+    <ds:schemaRef ds:uri="ESRI.ArcGIS.Mapping.OfficeIntegration.PowerPointInfo"/>
+  </ds:schemaRefs>
+</ds:datastoreItem>
+</file>
+
+<file path=customXml/itemProps38.xml><?xml version="1.0" encoding="utf-8"?>
+<ds:datastoreItem xmlns:ds="http://schemas.openxmlformats.org/officeDocument/2006/customXml" ds:itemID="{4B0DBE6B-7B57-46AA-86E7-F9E97B743822}">
+  <ds:schemaRefs>
+    <ds:schemaRef ds:uri="ESRI.ArcGIS.Mapping.OfficeIntegration.PowerPointInfo"/>
+  </ds:schemaRefs>
+</ds:datastoreItem>
+</file>
+
+<file path=customXml/itemProps39.xml><?xml version="1.0" encoding="utf-8"?>
+<ds:datastoreItem xmlns:ds="http://schemas.openxmlformats.org/officeDocument/2006/customXml" ds:itemID="{5C0B39C0-1E0C-44E9-8E23-EBDF7BBC46EB}">
+  <ds:schemaRefs>
+    <ds:schemaRef ds:uri="ESRI.ArcGIS.Mapping.OfficeIntegration.PowerPointInfo"/>
+  </ds:schemaRefs>
+</ds:datastoreItem>
+</file>
+
+<file path=customXml/itemProps4.xml><?xml version="1.0" encoding="utf-8"?>
+<ds:datastoreItem xmlns:ds="http://schemas.openxmlformats.org/officeDocument/2006/customXml" ds:itemID="{35201456-65E2-4B71-94B3-B380DF2A4DAB}">
+  <ds:schemaRefs>
+    <ds:schemaRef ds:uri="ESRI.ArcGIS.Mapping.OfficeIntegration.PowerPointInfo"/>
+  </ds:schemaRefs>
+</ds:datastoreItem>
+</file>
+
+<file path=customXml/itemProps40.xml><?xml version="1.0" encoding="utf-8"?>
+<ds:datastoreItem xmlns:ds="http://schemas.openxmlformats.org/officeDocument/2006/customXml" ds:itemID="{0E504B87-98A0-4527-8CFB-2899ADB5D8AE}">
+  <ds:schemaRefs>
+    <ds:schemaRef ds:uri="ESRI.ArcGIS.Mapping.OfficeIntegration.PowerPointInfo"/>
+  </ds:schemaRefs>
+</ds:datastoreItem>
+</file>
+
+<file path=customXml/itemProps41.xml><?xml version="1.0" encoding="utf-8"?>
+<ds:datastoreItem xmlns:ds="http://schemas.openxmlformats.org/officeDocument/2006/customXml" ds:itemID="{80DFB946-4516-4540-B473-E4506A73F7B1}">
+  <ds:schemaRefs>
+    <ds:schemaRef ds:uri="ESRI.ArcGIS.Mapping.OfficeIntegration.PowerPointInfo"/>
+  </ds:schemaRefs>
+</ds:datastoreItem>
+</file>
+
+<file path=customXml/itemProps42.xml><?xml version="1.0" encoding="utf-8"?>
+<ds:datastoreItem xmlns:ds="http://schemas.openxmlformats.org/officeDocument/2006/customXml" ds:itemID="{6C310EF3-A0F1-4CD2-9071-EA830FEFBED0}">
+  <ds:schemaRefs>
+    <ds:schemaRef ds:uri="ESRI.ArcGIS.Mapping.OfficeIntegration.PowerPointInfo"/>
+  </ds:schemaRefs>
+</ds:datastoreItem>
+</file>
+
+<file path=customXml/itemProps43.xml><?xml version="1.0" encoding="utf-8"?>
+<ds:datastoreItem xmlns:ds="http://schemas.openxmlformats.org/officeDocument/2006/customXml" ds:itemID="{BBB647FA-E060-4096-BBC8-453ED8E31741}">
+  <ds:schemaRefs>
+    <ds:schemaRef ds:uri="ESRI.ArcGIS.Mapping.OfficeIntegration.PowerPointInfo"/>
+  </ds:schemaRefs>
+</ds:datastoreItem>
+</file>
+
+<file path=customXml/itemProps44.xml><?xml version="1.0" encoding="utf-8"?>
+<ds:datastoreItem xmlns:ds="http://schemas.openxmlformats.org/officeDocument/2006/customXml" ds:itemID="{3F6C67C9-9C0D-4369-A4E8-3BAA683EB06D}">
+  <ds:schemaRefs>
+    <ds:schemaRef ds:uri="ESRI.ArcGIS.Mapping.OfficeIntegration.PowerPointInfo"/>
+  </ds:schemaRefs>
+</ds:datastoreItem>
+</file>
+
+<file path=customXml/itemProps45.xml><?xml version="1.0" encoding="utf-8"?>
+<ds:datastoreItem xmlns:ds="http://schemas.openxmlformats.org/officeDocument/2006/customXml" ds:itemID="{20927035-6B5B-4EBC-8388-CCAB2FC72BC1}">
+  <ds:schemaRefs>
+    <ds:schemaRef ds:uri="ESRI.ArcGIS.Mapping.OfficeIntegration.PowerPointInfo"/>
+  </ds:schemaRefs>
+</ds:datastoreItem>
+</file>
+
+<file path=customXml/itemProps46.xml><?xml version="1.0" encoding="utf-8"?>
+<ds:datastoreItem xmlns:ds="http://schemas.openxmlformats.org/officeDocument/2006/customXml" ds:itemID="{B2FFE9F0-A341-4617-AEAC-12914E0FB453}">
+  <ds:schemaRefs>
+    <ds:schemaRef ds:uri="ESRI.ArcGIS.Mapping.OfficeIntegration.PowerPointInfo"/>
+  </ds:schemaRefs>
+</ds:datastoreItem>
+</file>
+
+<file path=customXml/itemProps47.xml><?xml version="1.0" encoding="utf-8"?>
+<ds:datastoreItem xmlns:ds="http://schemas.openxmlformats.org/officeDocument/2006/customXml" ds:itemID="{F2C0F0AA-DE50-4CFF-A71A-17E85E670EB2}">
+  <ds:schemaRefs>
+    <ds:schemaRef ds:uri="ESRI.ArcGIS.Mapping.OfficeIntegration.PowerPointInfo"/>
+  </ds:schemaRefs>
+</ds:datastoreItem>
+</file>
+
+<file path=customXml/itemProps48.xml><?xml version="1.0" encoding="utf-8"?>
+<ds:datastoreItem xmlns:ds="http://schemas.openxmlformats.org/officeDocument/2006/customXml" ds:itemID="{858D46F7-192E-4E2D-B592-4B1F3576BA1D}">
+  <ds:schemaRefs>
+    <ds:schemaRef ds:uri="ESRI.ArcGIS.Mapping.OfficeIntegration.PowerPointInfo"/>
+  </ds:schemaRefs>
+</ds:datastoreItem>
+</file>
+
+<file path=customXml/itemProps49.xml><?xml version="1.0" encoding="utf-8"?>
+<ds:datastoreItem xmlns:ds="http://schemas.openxmlformats.org/officeDocument/2006/customXml" ds:itemID="{2A04FFEC-F060-4FAC-9569-F588C99AE08C}">
+  <ds:schemaRefs>
+    <ds:schemaRef ds:uri="ESRI.ArcGIS.Mapping.OfficeIntegration.PowerPointInfo"/>
+  </ds:schemaRefs>
+</ds:datastoreItem>
+</file>
+
+<file path=customXml/itemProps5.xml><?xml version="1.0" encoding="utf-8"?>
+<ds:datastoreItem xmlns:ds="http://schemas.openxmlformats.org/officeDocument/2006/customXml" ds:itemID="{56BFDDCC-5534-4ECE-84E8-E3E9914334AF}">
+  <ds:schemaRefs>
+    <ds:schemaRef ds:uri="ESRI.ArcGIS.Mapping.OfficeIntegration.PowerPointInfo"/>
+  </ds:schemaRefs>
+</ds:datastoreItem>
+</file>
+
+<file path=customXml/itemProps50.xml><?xml version="1.0" encoding="utf-8"?>
+<ds:datastoreItem xmlns:ds="http://schemas.openxmlformats.org/officeDocument/2006/customXml" ds:itemID="{122D97D5-4FF7-4DAA-AA6F-56CFF7BCB663}">
+  <ds:schemaRefs>
+    <ds:schemaRef ds:uri="ESRI.ArcGIS.Mapping.OfficeIntegration.PowerPointInfo"/>
+  </ds:schemaRefs>
+</ds:datastoreItem>
+</file>
+
+<file path=customXml/itemProps51.xml><?xml version="1.0" encoding="utf-8"?>
+<ds:datastoreItem xmlns:ds="http://schemas.openxmlformats.org/officeDocument/2006/customXml" ds:itemID="{19817691-0170-4AF0-ACEC-0705752D0DBA}">
+  <ds:schemaRefs>
+    <ds:schemaRef ds:uri="ESRI.ArcGIS.Mapping.OfficeIntegration.PowerPointInfo"/>
+  </ds:schemaRefs>
+</ds:datastoreItem>
+</file>
+
+<file path=customXml/itemProps52.xml><?xml version="1.0" encoding="utf-8"?>
+<ds:datastoreItem xmlns:ds="http://schemas.openxmlformats.org/officeDocument/2006/customXml" ds:itemID="{33829D15-DFC0-404A-BD45-B0E131DD553E}">
+  <ds:schemaRefs>
+    <ds:schemaRef ds:uri="ESRI.ArcGIS.Mapping.OfficeIntegration.PowerPointInfo"/>
+  </ds:schemaRefs>
+</ds:datastoreItem>
+</file>
+
+<file path=customXml/itemProps53.xml><?xml version="1.0" encoding="utf-8"?>
+<ds:datastoreItem xmlns:ds="http://schemas.openxmlformats.org/officeDocument/2006/customXml" ds:itemID="{90324B6F-A6E8-41EC-A38A-E8071ED047C6}">
+  <ds:schemaRefs>
+    <ds:schemaRef ds:uri="ESRI.ArcGIS.Mapping.OfficeIntegration.PowerPointInfo"/>
+  </ds:schemaRefs>
+</ds:datastoreItem>
+</file>
+
+<file path=customXml/itemProps54.xml><?xml version="1.0" encoding="utf-8"?>
+<ds:datastoreItem xmlns:ds="http://schemas.openxmlformats.org/officeDocument/2006/customXml" ds:itemID="{9FA11816-FE07-4F2C-A310-62A1997AED0C}">
+  <ds:schemaRefs>
+    <ds:schemaRef ds:uri="ESRI.ArcGIS.Mapping.OfficeIntegration.PowerPointInfo"/>
+  </ds:schemaRefs>
+</ds:datastoreItem>
+</file>
+
+<file path=customXml/itemProps55.xml><?xml version="1.0" encoding="utf-8"?>
+<ds:datastoreItem xmlns:ds="http://schemas.openxmlformats.org/officeDocument/2006/customXml" ds:itemID="{3B26344A-4E8D-46C8-B9C3-681AEF8F7732}">
+  <ds:schemaRefs>
+    <ds:schemaRef ds:uri="ESRI.ArcGIS.Mapping.OfficeIntegration.PowerPointInfo"/>
+  </ds:schemaRefs>
+</ds:datastoreItem>
+</file>
+
+<file path=customXml/itemProps56.xml><?xml version="1.0" encoding="utf-8"?>
+<ds:datastoreItem xmlns:ds="http://schemas.openxmlformats.org/officeDocument/2006/customXml" ds:itemID="{7233A7FC-5157-4E99-8ADB-E04C97CA43F9}">
+  <ds:schemaRefs>
+    <ds:schemaRef ds:uri="ESRI.ArcGIS.Mapping.OfficeIntegration.PowerPointInfo"/>
+  </ds:schemaRefs>
+</ds:datastoreItem>
+</file>
+
+<file path=customXml/itemProps57.xml><?xml version="1.0" encoding="utf-8"?>
+<ds:datastoreItem xmlns:ds="http://schemas.openxmlformats.org/officeDocument/2006/customXml" ds:itemID="{7A3811F6-6BD7-49FD-BEDB-9C6E42B103BC}">
+  <ds:schemaRefs>
+    <ds:schemaRef ds:uri="ESRI.ArcGIS.Mapping.OfficeIntegration.PowerPointInfo"/>
+  </ds:schemaRefs>
+</ds:datastoreItem>
+</file>
+
+<file path=customXml/itemProps58.xml><?xml version="1.0" encoding="utf-8"?>
+<ds:datastoreItem xmlns:ds="http://schemas.openxmlformats.org/officeDocument/2006/customXml" ds:itemID="{CF823F5D-A21A-47E1-B3B5-F870C0CF4412}">
+  <ds:schemaRefs>
+    <ds:schemaRef ds:uri="ESRI.ArcGIS.Mapping.OfficeIntegration.PowerPointInfo"/>
+  </ds:schemaRefs>
+</ds:datastoreItem>
+</file>
+
+<file path=customXml/itemProps59.xml><?xml version="1.0" encoding="utf-8"?>
+<ds:datastoreItem xmlns:ds="http://schemas.openxmlformats.org/officeDocument/2006/customXml" ds:itemID="{15DA27AF-4DCB-41FF-9C3F-91D327477E9D}">
+  <ds:schemaRefs>
+    <ds:schemaRef ds:uri="ESRI.ArcGIS.Mapping.OfficeIntegration.PowerPointInfo"/>
+  </ds:schemaRefs>
+</ds:datastoreItem>
+</file>
+
+<file path=customXml/itemProps6.xml><?xml version="1.0" encoding="utf-8"?>
+<ds:datastoreItem xmlns:ds="http://schemas.openxmlformats.org/officeDocument/2006/customXml" ds:itemID="{D9B47B32-4473-4F1D-9AB4-D1DD38E327B5}">
+  <ds:schemaRefs>
+    <ds:schemaRef ds:uri="ESRI.ArcGIS.Mapping.OfficeIntegration.PowerPointInfo"/>
+  </ds:schemaRefs>
+</ds:datastoreItem>
+</file>
+
+<file path=customXml/itemProps60.xml><?xml version="1.0" encoding="utf-8"?>
+<ds:datastoreItem xmlns:ds="http://schemas.openxmlformats.org/officeDocument/2006/customXml" ds:itemID="{178240AF-2DCF-4FDD-8AE9-E51669F2785F}">
+  <ds:schemaRefs>
+    <ds:schemaRef ds:uri="ESRI.ArcGIS.Mapping.OfficeIntegration.PowerPointInfo"/>
+  </ds:schemaRefs>
+</ds:datastoreItem>
+</file>
+
+<file path=customXml/itemProps61.xml><?xml version="1.0" encoding="utf-8"?>
+<ds:datastoreItem xmlns:ds="http://schemas.openxmlformats.org/officeDocument/2006/customXml" ds:itemID="{A7920F8A-4663-43F1-8B16-11842AEE5A4F}">
+  <ds:schemaRefs>
+    <ds:schemaRef ds:uri="ESRI.ArcGIS.Mapping.OfficeIntegration.PowerPointInfo"/>
+  </ds:schemaRefs>
+</ds:datastoreItem>
+</file>
+
+<file path=customXml/itemProps62.xml><?xml version="1.0" encoding="utf-8"?>
+<ds:datastoreItem xmlns:ds="http://schemas.openxmlformats.org/officeDocument/2006/customXml" ds:itemID="{C39D1460-F24D-4DF3-8742-E767D6F3CAA1}">
+  <ds:schemaRefs>
+    <ds:schemaRef ds:uri="ESRI.ArcGIS.Mapping.OfficeIntegration.PowerPointInfo"/>
+  </ds:schemaRefs>
+</ds:datastoreItem>
+</file>
+
+<file path=customXml/itemProps63.xml><?xml version="1.0" encoding="utf-8"?>
+<ds:datastoreItem xmlns:ds="http://schemas.openxmlformats.org/officeDocument/2006/customXml" ds:itemID="{5E79A1E8-26E5-4724-87CE-CF963D07CCCB}">
+  <ds:schemaRefs>
+    <ds:schemaRef ds:uri="ESRI.ArcGIS.Mapping.OfficeIntegration.PowerPointInfo"/>
+  </ds:schemaRefs>
+</ds:datastoreItem>
+</file>
+
+<file path=customXml/itemProps64.xml><?xml version="1.0" encoding="utf-8"?>
+<ds:datastoreItem xmlns:ds="http://schemas.openxmlformats.org/officeDocument/2006/customXml" ds:itemID="{38944470-50D2-4E98-94FB-28D3A3A94F26}">
+  <ds:schemaRefs>
+    <ds:schemaRef ds:uri="ESRI.ArcGIS.Mapping.OfficeIntegration.PowerPointInfo"/>
+  </ds:schemaRefs>
+</ds:datastoreItem>
+</file>
+
+<file path=customXml/itemProps65.xml><?xml version="1.0" encoding="utf-8"?>
+<ds:datastoreItem xmlns:ds="http://schemas.openxmlformats.org/officeDocument/2006/customXml" ds:itemID="{F4718E52-05AF-4701-869C-7779E1869EA3}">
+  <ds:schemaRefs>
+    <ds:schemaRef ds:uri="ESRI.ArcGIS.Mapping.OfficeIntegration.PowerPointInfo"/>
+  </ds:schemaRefs>
+</ds:datastoreItem>
+</file>
+
+<file path=customXml/itemProps66.xml><?xml version="1.0" encoding="utf-8"?>
+<ds:datastoreItem xmlns:ds="http://schemas.openxmlformats.org/officeDocument/2006/customXml" ds:itemID="{A40B5D01-A378-4AE9-B186-D1A12D4CE2AA}">
+  <ds:schemaRefs>
+    <ds:schemaRef ds:uri="ESRI.ArcGIS.Mapping.OfficeIntegration.PowerPointInfo"/>
+  </ds:schemaRefs>
+</ds:datastoreItem>
+</file>
+
+<file path=customXml/itemProps67.xml><?xml version="1.0" encoding="utf-8"?>
+<ds:datastoreItem xmlns:ds="http://schemas.openxmlformats.org/officeDocument/2006/customXml" ds:itemID="{FDAC95F5-438D-4CBE-9FBB-7E8EEED9AA41}">
+  <ds:schemaRefs>
+    <ds:schemaRef ds:uri="ESRI.ArcGIS.Mapping.OfficeIntegration.PowerPointInfo"/>
+  </ds:schemaRefs>
+</ds:datastoreItem>
+</file>
+
+<file path=customXml/itemProps68.xml><?xml version="1.0" encoding="utf-8"?>
+<ds:datastoreItem xmlns:ds="http://schemas.openxmlformats.org/officeDocument/2006/customXml" ds:itemID="{8404A4AE-BD08-4DE4-9709-8DC58122A84E}">
+  <ds:schemaRefs>
+    <ds:schemaRef ds:uri="ESRI.ArcGIS.Mapping.OfficeIntegration.PowerPointInfo"/>
+  </ds:schemaRefs>
+</ds:datastoreItem>
+</file>
+
+<file path=customXml/itemProps69.xml><?xml version="1.0" encoding="utf-8"?>
+<ds:datastoreItem xmlns:ds="http://schemas.openxmlformats.org/officeDocument/2006/customXml" ds:itemID="{8003D678-526F-4DCC-A721-20D3A8729AD0}">
+  <ds:schemaRefs>
+    <ds:schemaRef ds:uri="ESRI.ArcGIS.Mapping.OfficeIntegration.PowerPointInfo"/>
+  </ds:schemaRefs>
+</ds:datastoreItem>
+</file>
+
+<file path=customXml/itemProps7.xml><?xml version="1.0" encoding="utf-8"?>
+<ds:datastoreItem xmlns:ds="http://schemas.openxmlformats.org/officeDocument/2006/customXml" ds:itemID="{35B51984-CAA1-4045-8B87-A2D93412BE0D}">
+  <ds:schemaRefs>
+    <ds:schemaRef ds:uri="ESRI.ArcGIS.Mapping.OfficeIntegration.PowerPointInfo"/>
+  </ds:schemaRefs>
+</ds:datastoreItem>
+</file>
+
+<file path=customXml/itemProps70.xml><?xml version="1.0" encoding="utf-8"?>
+<ds:datastoreItem xmlns:ds="http://schemas.openxmlformats.org/officeDocument/2006/customXml" ds:itemID="{646B6F9B-3300-4256-8FA0-A0D126A594D0}">
+  <ds:schemaRefs>
+    <ds:schemaRef ds:uri="ESRI.ArcGIS.Mapping.OfficeIntegration.PowerPointInfo"/>
+  </ds:schemaRefs>
+</ds:datastoreItem>
+</file>
+
+<file path=customXml/itemProps71.xml><?xml version="1.0" encoding="utf-8"?>
+<ds:datastoreItem xmlns:ds="http://schemas.openxmlformats.org/officeDocument/2006/customXml" ds:itemID="{B578D071-2CEF-4D6E-AA45-FCAB0C469A16}">
+  <ds:schemaRefs>
+    <ds:schemaRef ds:uri="ESRI.ArcGIS.Mapping.OfficeIntegration.PowerPointInfo"/>
+  </ds:schemaRefs>
+</ds:datastoreItem>
+</file>
+
+<file path=customXml/itemProps72.xml><?xml version="1.0" encoding="utf-8"?>
+<ds:datastoreItem xmlns:ds="http://schemas.openxmlformats.org/officeDocument/2006/customXml" ds:itemID="{52852150-2A24-4013-ACC6-201B4FA4AC9E}">
+  <ds:schemaRefs>
+    <ds:schemaRef ds:uri="ESRI.ArcGIS.Mapping.OfficeIntegration.PowerPointInfo"/>
+  </ds:schemaRefs>
+</ds:datastoreItem>
+</file>
+
+<file path=customXml/itemProps73.xml><?xml version="1.0" encoding="utf-8"?>
 <ds:datastoreItem xmlns:ds="http://schemas.openxmlformats.org/officeDocument/2006/customXml" ds:itemID="{15C635CE-D503-459C-A6C1-D46A4B790773}">
   <ds:schemaRefs>
     <ds:schemaRef ds:uri="ESRI.ArcGIS.Mapping.OfficeIntegration.PowerPointInfo"/>
@@ -6931,23 +7609,103 @@
 </ds:datastoreItem>
 </file>
 
-<file path=customXml/itemProps10.xml><?xml version="1.0" encoding="utf-8"?>
-<ds:datastoreItem xmlns:ds="http://schemas.openxmlformats.org/officeDocument/2006/customXml" ds:itemID="{BC256338-B0F4-4B4C-ADA9-9050D1EE2A96}">
-  <ds:schemaRefs>
-    <ds:schemaRef ds:uri="ESRI.ArcGIS.Mapping.OfficeIntegration.PowerPointInfo"/>
-  </ds:schemaRefs>
-</ds:datastoreItem>
-</file>
-
-<file path=customXml/itemProps11.xml><?xml version="1.0" encoding="utf-8"?>
-<ds:datastoreItem xmlns:ds="http://schemas.openxmlformats.org/officeDocument/2006/customXml" ds:itemID="{C39D1460-F24D-4DF3-8742-E767D6F3CAA1}">
-  <ds:schemaRefs>
-    <ds:schemaRef ds:uri="ESRI.ArcGIS.Mapping.OfficeIntegration.PowerPointInfo"/>
-  </ds:schemaRefs>
-</ds:datastoreItem>
-</file>
-
-<file path=customXml/itemProps12.xml><?xml version="1.0" encoding="utf-8"?>
+<file path=customXml/itemProps74.xml><?xml version="1.0" encoding="utf-8"?>
+<ds:datastoreItem xmlns:ds="http://schemas.openxmlformats.org/officeDocument/2006/customXml" ds:itemID="{42F4782D-E9D3-463E-B04C-091D36EFF9C9}">
+  <ds:schemaRefs>
+    <ds:schemaRef ds:uri="ESRI.ArcGIS.Mapping.OfficeIntegration.PowerPointInfo"/>
+  </ds:schemaRefs>
+</ds:datastoreItem>
+</file>
+
+<file path=customXml/itemProps75.xml><?xml version="1.0" encoding="utf-8"?>
+<ds:datastoreItem xmlns:ds="http://schemas.openxmlformats.org/officeDocument/2006/customXml" ds:itemID="{ACFBDB26-86CD-4EC3-A5FC-95172352B52D}">
+  <ds:schemaRefs>
+    <ds:schemaRef ds:uri="ESRI.ArcGIS.Mapping.OfficeIntegration.PowerPointInfo"/>
+  </ds:schemaRefs>
+</ds:datastoreItem>
+</file>
+
+<file path=customXml/itemProps76.xml><?xml version="1.0" encoding="utf-8"?>
+<ds:datastoreItem xmlns:ds="http://schemas.openxmlformats.org/officeDocument/2006/customXml" ds:itemID="{BFB1D79A-7981-4359-A76F-E01A348DA2FA}">
+  <ds:schemaRefs>
+    <ds:schemaRef ds:uri="ESRI.ArcGIS.Mapping.OfficeIntegration.PowerPointInfo"/>
+  </ds:schemaRefs>
+</ds:datastoreItem>
+</file>
+
+<file path=customXml/itemProps77.xml><?xml version="1.0" encoding="utf-8"?>
+<ds:datastoreItem xmlns:ds="http://schemas.openxmlformats.org/officeDocument/2006/customXml" ds:itemID="{F8DCA1EA-A1EC-496C-A7B7-9ADA0274FC08}">
+  <ds:schemaRefs>
+    <ds:schemaRef ds:uri="ESRI.ArcGIS.Mapping.OfficeIntegration.PowerPointInfo"/>
+  </ds:schemaRefs>
+</ds:datastoreItem>
+</file>
+
+<file path=customXml/itemProps78.xml><?xml version="1.0" encoding="utf-8"?>
+<ds:datastoreItem xmlns:ds="http://schemas.openxmlformats.org/officeDocument/2006/customXml" ds:itemID="{5EDF6957-CB02-44B3-8071-8261DD8BC426}">
+  <ds:schemaRefs>
+    <ds:schemaRef ds:uri="ESRI.ArcGIS.Mapping.OfficeIntegration.PowerPointInfo"/>
+  </ds:schemaRefs>
+</ds:datastoreItem>
+</file>
+
+<file path=customXml/itemProps79.xml><?xml version="1.0" encoding="utf-8"?>
+<ds:datastoreItem xmlns:ds="http://schemas.openxmlformats.org/officeDocument/2006/customXml" ds:itemID="{0E86A51D-1D5D-4C8B-AEAF-AA7C3260A3A9}">
+  <ds:schemaRefs>
+    <ds:schemaRef ds:uri="ESRI.ArcGIS.Mapping.OfficeIntegration.PowerPointInfo"/>
+  </ds:schemaRefs>
+</ds:datastoreItem>
+</file>
+
+<file path=customXml/itemProps8.xml><?xml version="1.0" encoding="utf-8"?>
+<ds:datastoreItem xmlns:ds="http://schemas.openxmlformats.org/officeDocument/2006/customXml" ds:itemID="{AC5386F8-3C91-4C94-9CC1-555F27CBDC6B}">
+  <ds:schemaRefs>
+    <ds:schemaRef ds:uri="ESRI.ArcGIS.Mapping.OfficeIntegration.PowerPointInfo"/>
+  </ds:schemaRefs>
+</ds:datastoreItem>
+</file>
+
+<file path=customXml/itemProps80.xml><?xml version="1.0" encoding="utf-8"?>
+<ds:datastoreItem xmlns:ds="http://schemas.openxmlformats.org/officeDocument/2006/customXml" ds:itemID="{EC8894B9-8141-48BE-9754-9ABD677C0C53}">
+  <ds:schemaRefs>
+    <ds:schemaRef ds:uri="ESRI.ArcGIS.Mapping.OfficeIntegration.PowerPointInfo"/>
+  </ds:schemaRefs>
+</ds:datastoreItem>
+</file>
+
+<file path=customXml/itemProps81.xml><?xml version="1.0" encoding="utf-8"?>
+<ds:datastoreItem xmlns:ds="http://schemas.openxmlformats.org/officeDocument/2006/customXml" ds:itemID="{67085A74-2577-4959-8764-2A6472FA70F8}">
+  <ds:schemaRefs>
+    <ds:schemaRef ds:uri="ESRI.ArcGIS.Mapping.OfficeIntegration.PowerPointInfo"/>
+  </ds:schemaRefs>
+</ds:datastoreItem>
+</file>
+
+<file path=customXml/itemProps82.xml><?xml version="1.0" encoding="utf-8"?>
+<ds:datastoreItem xmlns:ds="http://schemas.openxmlformats.org/officeDocument/2006/customXml" ds:itemID="{78353EAB-D2C8-42D7-B5D5-8E92AB06BD68}">
+  <ds:schemaRefs>
+    <ds:schemaRef ds:uri="ESRI.ArcGIS.Mapping.OfficeIntegration.PowerPointInfo"/>
+  </ds:schemaRefs>
+</ds:datastoreItem>
+</file>
+
+<file path=customXml/itemProps83.xml><?xml version="1.0" encoding="utf-8"?>
+<ds:datastoreItem xmlns:ds="http://schemas.openxmlformats.org/officeDocument/2006/customXml" ds:itemID="{FDE65644-E4D0-4915-B68D-6BCB3FC898A0}">
+  <ds:schemaRefs>
+    <ds:schemaRef ds:uri="ESRI.ArcGIS.Mapping.OfficeIntegration.PowerPointInfo"/>
+  </ds:schemaRefs>
+</ds:datastoreItem>
+</file>
+
+<file path=customXml/itemProps84.xml><?xml version="1.0" encoding="utf-8"?>
+<ds:datastoreItem xmlns:ds="http://schemas.openxmlformats.org/officeDocument/2006/customXml" ds:itemID="{814125C8-3A61-4145-B950-99BA7873FE67}">
+  <ds:schemaRefs>
+    <ds:schemaRef ds:uri="ESRI.ArcGIS.Mapping.OfficeIntegration.PowerPointInfo"/>
+  </ds:schemaRefs>
+</ds:datastoreItem>
+</file>
+
+<file path=customXml/itemProps85.xml><?xml version="1.0" encoding="utf-8"?>
 <ds:datastoreItem xmlns:ds="http://schemas.openxmlformats.org/officeDocument/2006/customXml" ds:itemID="{E6891263-DA7F-4837-B3C1-34FF3E2AB2D5}">
   <ds:schemaRefs>
     <ds:schemaRef ds:uri="ESRI.ArcGIS.Mapping.OfficeIntegration.PowerPointInfo"/>
@@ -6955,39 +7713,79 @@
 </ds:datastoreItem>
 </file>
 
-<file path=customXml/itemProps13.xml><?xml version="1.0" encoding="utf-8"?>
-<ds:datastoreItem xmlns:ds="http://schemas.openxmlformats.org/officeDocument/2006/customXml" ds:itemID="{5EDF6957-CB02-44B3-8071-8261DD8BC426}">
-  <ds:schemaRefs>
-    <ds:schemaRef ds:uri="ESRI.ArcGIS.Mapping.OfficeIntegration.PowerPointInfo"/>
-  </ds:schemaRefs>
-</ds:datastoreItem>
-</file>
-
-<file path=customXml/itemProps14.xml><?xml version="1.0" encoding="utf-8"?>
-<ds:datastoreItem xmlns:ds="http://schemas.openxmlformats.org/officeDocument/2006/customXml" ds:itemID="{178240AF-2DCF-4FDD-8AE9-E51669F2785F}">
-  <ds:schemaRefs>
-    <ds:schemaRef ds:uri="ESRI.ArcGIS.Mapping.OfficeIntegration.PowerPointInfo"/>
-  </ds:schemaRefs>
-</ds:datastoreItem>
-</file>
-
-<file path=customXml/itemProps15.xml><?xml version="1.0" encoding="utf-8"?>
-<ds:datastoreItem xmlns:ds="http://schemas.openxmlformats.org/officeDocument/2006/customXml" ds:itemID="{35B51984-CAA1-4045-8B87-A2D93412BE0D}">
-  <ds:schemaRefs>
-    <ds:schemaRef ds:uri="ESRI.ArcGIS.Mapping.OfficeIntegration.PowerPointInfo"/>
-  </ds:schemaRefs>
-</ds:datastoreItem>
-</file>
-
-<file path=customXml/itemProps16.xml><?xml version="1.0" encoding="utf-8"?>
-<ds:datastoreItem xmlns:ds="http://schemas.openxmlformats.org/officeDocument/2006/customXml" ds:itemID="{A2682B7B-CB0F-45B9-913A-5D8C43E0FCBA}">
-  <ds:schemaRefs>
-    <ds:schemaRef ds:uri="ESRI.ArcGIS.Mapping.OfficeIntegration.PowerPointInfo"/>
-  </ds:schemaRefs>
-</ds:datastoreItem>
-</file>
-
-<file path=customXml/itemProps17.xml><?xml version="1.0" encoding="utf-8"?>
+<file path=customXml/itemProps86.xml><?xml version="1.0" encoding="utf-8"?>
+<ds:datastoreItem xmlns:ds="http://schemas.openxmlformats.org/officeDocument/2006/customXml" ds:itemID="{01407661-C13D-4BD9-A2A0-F2B94B44392F}">
+  <ds:schemaRefs>
+    <ds:schemaRef ds:uri="ESRI.ArcGIS.Mapping.OfficeIntegration.PowerPointInfo"/>
+  </ds:schemaRefs>
+</ds:datastoreItem>
+</file>
+
+<file path=customXml/itemProps87.xml><?xml version="1.0" encoding="utf-8"?>
+<ds:datastoreItem xmlns:ds="http://schemas.openxmlformats.org/officeDocument/2006/customXml" ds:itemID="{F2E4A109-D142-4BF9-8213-DE4BFAFF8F3C}">
+  <ds:schemaRefs>
+    <ds:schemaRef ds:uri="ESRI.ArcGIS.Mapping.OfficeIntegration.PowerPointInfo"/>
+  </ds:schemaRefs>
+</ds:datastoreItem>
+</file>
+
+<file path=customXml/itemProps88.xml><?xml version="1.0" encoding="utf-8"?>
+<ds:datastoreItem xmlns:ds="http://schemas.openxmlformats.org/officeDocument/2006/customXml" ds:itemID="{AB51B998-B977-4E3E-B21B-958F6CE5DC84}">
+  <ds:schemaRefs>
+    <ds:schemaRef ds:uri="ESRI.ArcGIS.Mapping.OfficeIntegration.PowerPointInfo"/>
+  </ds:schemaRefs>
+</ds:datastoreItem>
+</file>
+
+<file path=customXml/itemProps89.xml><?xml version="1.0" encoding="utf-8"?>
+<ds:datastoreItem xmlns:ds="http://schemas.openxmlformats.org/officeDocument/2006/customXml" ds:itemID="{9E9D7983-8A78-4FD8-9A61-A6F7E1C78D21}">
+  <ds:schemaRefs>
+    <ds:schemaRef ds:uri="ESRI.ArcGIS.Mapping.OfficeIntegration.PowerPointInfo"/>
+  </ds:schemaRefs>
+</ds:datastoreItem>
+</file>
+
+<file path=customXml/itemProps9.xml><?xml version="1.0" encoding="utf-8"?>
+<ds:datastoreItem xmlns:ds="http://schemas.openxmlformats.org/officeDocument/2006/customXml" ds:itemID="{DB42D8A2-64C8-4896-9816-F58AEF7504B2}">
+  <ds:schemaRefs>
+    <ds:schemaRef ds:uri="ESRI.ArcGIS.Mapping.OfficeIntegration.PowerPointInfo"/>
+  </ds:schemaRefs>
+</ds:datastoreItem>
+</file>
+
+<file path=customXml/itemProps90.xml><?xml version="1.0" encoding="utf-8"?>
+<ds:datastoreItem xmlns:ds="http://schemas.openxmlformats.org/officeDocument/2006/customXml" ds:itemID="{4D9F7826-2E0F-4037-B7DF-CFB4AF9F4DC5}">
+  <ds:schemaRefs>
+    <ds:schemaRef ds:uri="ESRI.ArcGIS.Mapping.OfficeIntegration.PowerPointInfo"/>
+  </ds:schemaRefs>
+</ds:datastoreItem>
+</file>
+
+<file path=customXml/itemProps91.xml><?xml version="1.0" encoding="utf-8"?>
+<ds:datastoreItem xmlns:ds="http://schemas.openxmlformats.org/officeDocument/2006/customXml" ds:itemID="{4379939E-B07C-46E0-9FD6-3FDDCB2AA2E8}">
+  <ds:schemaRefs>
+    <ds:schemaRef ds:uri="ESRI.ArcGIS.Mapping.OfficeIntegration.PowerPointInfo"/>
+  </ds:schemaRefs>
+</ds:datastoreItem>
+</file>
+
+<file path=customXml/itemProps92.xml><?xml version="1.0" encoding="utf-8"?>
+<ds:datastoreItem xmlns:ds="http://schemas.openxmlformats.org/officeDocument/2006/customXml" ds:itemID="{EFEA9EBB-410F-46E7-963E-583DC45745E4}">
+  <ds:schemaRefs>
+    <ds:schemaRef ds:uri="ESRI.ArcGIS.Mapping.OfficeIntegration.PowerPointInfo"/>
+  </ds:schemaRefs>
+</ds:datastoreItem>
+</file>
+
+<file path=customXml/itemProps93.xml><?xml version="1.0" encoding="utf-8"?>
+<ds:datastoreItem xmlns:ds="http://schemas.openxmlformats.org/officeDocument/2006/customXml" ds:itemID="{3F4A5EA0-0FC9-40FA-8639-E086C8CA9090}">
+  <ds:schemaRefs>
+    <ds:schemaRef ds:uri="ESRI.ArcGIS.Mapping.OfficeIntegration.PowerPointInfo"/>
+  </ds:schemaRefs>
+</ds:datastoreItem>
+</file>
+
+<file path=customXml/itemProps94.xml><?xml version="1.0" encoding="utf-8"?>
 <ds:datastoreItem xmlns:ds="http://schemas.openxmlformats.org/officeDocument/2006/customXml" ds:itemID="{E15998D2-D052-47C6-A3B4-EA8DBB3DAF7F}">
   <ds:schemaRefs>
     <ds:schemaRef ds:uri="ESRI.ArcGIS.Mapping.OfficeIntegration.PowerPointInfo"/>
@@ -6995,383 +7793,7 @@
 </ds:datastoreItem>
 </file>
 
-<file path=customXml/itemProps18.xml><?xml version="1.0" encoding="utf-8"?>
-<ds:datastoreItem xmlns:ds="http://schemas.openxmlformats.org/officeDocument/2006/customXml" ds:itemID="{6C310EF3-A0F1-4CD2-9071-EA830FEFBED0}">
-  <ds:schemaRefs>
-    <ds:schemaRef ds:uri="ESRI.ArcGIS.Mapping.OfficeIntegration.PowerPointInfo"/>
-  </ds:schemaRefs>
-</ds:datastoreItem>
-</file>
-
-<file path=customXml/itemProps19.xml><?xml version="1.0" encoding="utf-8"?>
-<ds:datastoreItem xmlns:ds="http://schemas.openxmlformats.org/officeDocument/2006/customXml" ds:itemID="{A62081BB-8EE0-4907-A77C-AA4385BFFB24}">
-  <ds:schemaRefs>
-    <ds:schemaRef ds:uri="ESRI.ArcGIS.Mapping.OfficeIntegration.PowerPointInfo"/>
-  </ds:schemaRefs>
-</ds:datastoreItem>
-</file>
-
-<file path=customXml/itemProps2.xml><?xml version="1.0" encoding="utf-8"?>
-<ds:datastoreItem xmlns:ds="http://schemas.openxmlformats.org/officeDocument/2006/customXml" ds:itemID="{8003D678-526F-4DCC-A721-20D3A8729AD0}">
-  <ds:schemaRefs>
-    <ds:schemaRef ds:uri="ESRI.ArcGIS.Mapping.OfficeIntegration.PowerPointInfo"/>
-  </ds:schemaRefs>
-</ds:datastoreItem>
-</file>
-
-<file path=customXml/itemProps20.xml><?xml version="1.0" encoding="utf-8"?>
-<ds:datastoreItem xmlns:ds="http://schemas.openxmlformats.org/officeDocument/2006/customXml" ds:itemID="{E215F23A-A7E3-44C9-87D9-A01E58570A86}">
-  <ds:schemaRefs>
-    <ds:schemaRef ds:uri="ESRI.ArcGIS.Mapping.OfficeIntegration.PowerPointInfo"/>
-  </ds:schemaRefs>
-</ds:datastoreItem>
-</file>
-
-<file path=customXml/itemProps21.xml><?xml version="1.0" encoding="utf-8"?>
-<ds:datastoreItem xmlns:ds="http://schemas.openxmlformats.org/officeDocument/2006/customXml" ds:itemID="{0BBCE46F-CB8D-4F8F-ADD9-7F362D1D91C6}">
-  <ds:schemaRefs>
-    <ds:schemaRef ds:uri="ESRI.ArcGIS.Mapping.OfficeIntegration.PowerPointInfo"/>
-  </ds:schemaRefs>
-</ds:datastoreItem>
-</file>
-
-<file path=customXml/itemProps22.xml><?xml version="1.0" encoding="utf-8"?>
-<ds:datastoreItem xmlns:ds="http://schemas.openxmlformats.org/officeDocument/2006/customXml" ds:itemID="{E97E5AC9-EB0E-4E17-82F5-29C257EEEB45}">
-  <ds:schemaRefs>
-    <ds:schemaRef ds:uri="ESRI.ArcGIS.Mapping.OfficeIntegration.PowerPointInfo"/>
-  </ds:schemaRefs>
-</ds:datastoreItem>
-</file>
-
-<file path=customXml/itemProps23.xml><?xml version="1.0" encoding="utf-8"?>
-<ds:datastoreItem xmlns:ds="http://schemas.openxmlformats.org/officeDocument/2006/customXml" ds:itemID="{76256A5F-5E77-404E-ACE6-E5F14B242FEF}">
-  <ds:schemaRefs>
-    <ds:schemaRef ds:uri="ESRI.ArcGIS.Mapping.OfficeIntegration.PowerPointInfo"/>
-  </ds:schemaRefs>
-</ds:datastoreItem>
-</file>
-
-<file path=customXml/itemProps24.xml><?xml version="1.0" encoding="utf-8"?>
-<ds:datastoreItem xmlns:ds="http://schemas.openxmlformats.org/officeDocument/2006/customXml" ds:itemID="{0AEA82C0-ED10-42A7-944B-5E3E18581F28}">
-  <ds:schemaRefs>
-    <ds:schemaRef ds:uri="ESRI.ArcGIS.Mapping.OfficeIntegration.PowerPointInfo"/>
-  </ds:schemaRefs>
-</ds:datastoreItem>
-</file>
-
-<file path=customXml/itemProps25.xml><?xml version="1.0" encoding="utf-8"?>
-<ds:datastoreItem xmlns:ds="http://schemas.openxmlformats.org/officeDocument/2006/customXml" ds:itemID="{F2C0F0AA-DE50-4CFF-A71A-17E85E670EB2}">
-  <ds:schemaRefs>
-    <ds:schemaRef ds:uri="ESRI.ArcGIS.Mapping.OfficeIntegration.PowerPointInfo"/>
-  </ds:schemaRefs>
-</ds:datastoreItem>
-</file>
-
-<file path=customXml/itemProps26.xml><?xml version="1.0" encoding="utf-8"?>
-<ds:datastoreItem xmlns:ds="http://schemas.openxmlformats.org/officeDocument/2006/customXml" ds:itemID="{35201456-65E2-4B71-94B3-B380DF2A4DAB}">
-  <ds:schemaRefs>
-    <ds:schemaRef ds:uri="ESRI.ArcGIS.Mapping.OfficeIntegration.PowerPointInfo"/>
-  </ds:schemaRefs>
-</ds:datastoreItem>
-</file>
-
-<file path=customXml/itemProps27.xml><?xml version="1.0" encoding="utf-8"?>
-<ds:datastoreItem xmlns:ds="http://schemas.openxmlformats.org/officeDocument/2006/customXml" ds:itemID="{33829D15-DFC0-404A-BD45-B0E131DD553E}">
-  <ds:schemaRefs>
-    <ds:schemaRef ds:uri="ESRI.ArcGIS.Mapping.OfficeIntegration.PowerPointInfo"/>
-  </ds:schemaRefs>
-</ds:datastoreItem>
-</file>
-
-<file path=customXml/itemProps28.xml><?xml version="1.0" encoding="utf-8"?>
-<ds:datastoreItem xmlns:ds="http://schemas.openxmlformats.org/officeDocument/2006/customXml" ds:itemID="{3B26344A-4E8D-46C8-B9C3-681AEF8F7732}">
-  <ds:schemaRefs>
-    <ds:schemaRef ds:uri="ESRI.ArcGIS.Mapping.OfficeIntegration.PowerPointInfo"/>
-  </ds:schemaRefs>
-</ds:datastoreItem>
-</file>
-
-<file path=customXml/itemProps29.xml><?xml version="1.0" encoding="utf-8"?>
-<ds:datastoreItem xmlns:ds="http://schemas.openxmlformats.org/officeDocument/2006/customXml" ds:itemID="{F2E4A109-D142-4BF9-8213-DE4BFAFF8F3C}">
-  <ds:schemaRefs>
-    <ds:schemaRef ds:uri="ESRI.ArcGIS.Mapping.OfficeIntegration.PowerPointInfo"/>
-  </ds:schemaRefs>
-</ds:datastoreItem>
-</file>
-
-<file path=customXml/itemProps3.xml><?xml version="1.0" encoding="utf-8"?>
-<ds:datastoreItem xmlns:ds="http://schemas.openxmlformats.org/officeDocument/2006/customXml" ds:itemID="{1F1BC2FE-0061-43E0-A06F-CBC8207133B9}">
-  <ds:schemaRefs>
-    <ds:schemaRef ds:uri="ESRI.ArcGIS.Mapping.OfficeIntegration.PowerPointInfo"/>
-  </ds:schemaRefs>
-</ds:datastoreItem>
-</file>
-
-<file path=customXml/itemProps30.xml><?xml version="1.0" encoding="utf-8"?>
-<ds:datastoreItem xmlns:ds="http://schemas.openxmlformats.org/officeDocument/2006/customXml" ds:itemID="{0E86A51D-1D5D-4C8B-AEAF-AA7C3260A3A9}">
-  <ds:schemaRefs>
-    <ds:schemaRef ds:uri="ESRI.ArcGIS.Mapping.OfficeIntegration.PowerPointInfo"/>
-  </ds:schemaRefs>
-</ds:datastoreItem>
-</file>
-
-<file path=customXml/itemProps31.xml><?xml version="1.0" encoding="utf-8"?>
-<ds:datastoreItem xmlns:ds="http://schemas.openxmlformats.org/officeDocument/2006/customXml" ds:itemID="{9FA11816-FE07-4F2C-A310-62A1997AED0C}">
-  <ds:schemaRefs>
-    <ds:schemaRef ds:uri="ESRI.ArcGIS.Mapping.OfficeIntegration.PowerPointInfo"/>
-  </ds:schemaRefs>
-</ds:datastoreItem>
-</file>
-
-<file path=customXml/itemProps32.xml><?xml version="1.0" encoding="utf-8"?>
-<ds:datastoreItem xmlns:ds="http://schemas.openxmlformats.org/officeDocument/2006/customXml" ds:itemID="{67085A74-2577-4959-8764-2A6472FA70F8}">
-  <ds:schemaRefs>
-    <ds:schemaRef ds:uri="ESRI.ArcGIS.Mapping.OfficeIntegration.PowerPointInfo"/>
-  </ds:schemaRefs>
-</ds:datastoreItem>
-</file>
-
-<file path=customXml/itemProps33.xml><?xml version="1.0" encoding="utf-8"?>
-<ds:datastoreItem xmlns:ds="http://schemas.openxmlformats.org/officeDocument/2006/customXml" ds:itemID="{9F3F1C5C-7B45-487C-9DC2-3C73D2F709E7}">
-  <ds:schemaRefs>
-    <ds:schemaRef ds:uri="ESRI.ArcGIS.Mapping.OfficeIntegration.PowerPointInfo"/>
-  </ds:schemaRefs>
-</ds:datastoreItem>
-</file>
-
-<file path=customXml/itemProps34.xml><?xml version="1.0" encoding="utf-8"?>
-<ds:datastoreItem xmlns:ds="http://schemas.openxmlformats.org/officeDocument/2006/customXml" ds:itemID="{A7AB7DF8-F007-4556-A232-360A414ABD0F}">
-  <ds:schemaRefs>
-    <ds:schemaRef ds:uri="ESRI.ArcGIS.Mapping.OfficeIntegration.PowerPointInfo"/>
-  </ds:schemaRefs>
-</ds:datastoreItem>
-</file>
-
-<file path=customXml/itemProps35.xml><?xml version="1.0" encoding="utf-8"?>
-<ds:datastoreItem xmlns:ds="http://schemas.openxmlformats.org/officeDocument/2006/customXml" ds:itemID="{20927035-6B5B-4EBC-8388-CCAB2FC72BC1}">
-  <ds:schemaRefs>
-    <ds:schemaRef ds:uri="ESRI.ArcGIS.Mapping.OfficeIntegration.PowerPointInfo"/>
-  </ds:schemaRefs>
-</ds:datastoreItem>
-</file>
-
-<file path=customXml/itemProps36.xml><?xml version="1.0" encoding="utf-8"?>
-<ds:datastoreItem xmlns:ds="http://schemas.openxmlformats.org/officeDocument/2006/customXml" ds:itemID="{42F4782D-E9D3-463E-B04C-091D36EFF9C9}">
-  <ds:schemaRefs>
-    <ds:schemaRef ds:uri="ESRI.ArcGIS.Mapping.OfficeIntegration.PowerPointInfo"/>
-  </ds:schemaRefs>
-</ds:datastoreItem>
-</file>
-
-<file path=customXml/itemProps37.xml><?xml version="1.0" encoding="utf-8"?>
-<ds:datastoreItem xmlns:ds="http://schemas.openxmlformats.org/officeDocument/2006/customXml" ds:itemID="{122D97D5-4FF7-4DAA-AA6F-56CFF7BCB663}">
-  <ds:schemaRefs>
-    <ds:schemaRef ds:uri="ESRI.ArcGIS.Mapping.OfficeIntegration.PowerPointInfo"/>
-  </ds:schemaRefs>
-</ds:datastoreItem>
-</file>
-
-<file path=customXml/itemProps38.xml><?xml version="1.0" encoding="utf-8"?>
-<ds:datastoreItem xmlns:ds="http://schemas.openxmlformats.org/officeDocument/2006/customXml" ds:itemID="{EB87CEDC-8E2C-4C48-9DD3-9796D551280D}">
-  <ds:schemaRefs>
-    <ds:schemaRef ds:uri="ESRI.ArcGIS.Mapping.OfficeIntegration.PowerPointInfo"/>
-  </ds:schemaRefs>
-</ds:datastoreItem>
-</file>
-
-<file path=customXml/itemProps39.xml><?xml version="1.0" encoding="utf-8"?>
-<ds:datastoreItem xmlns:ds="http://schemas.openxmlformats.org/officeDocument/2006/customXml" ds:itemID="{DB42D8A2-64C8-4896-9816-F58AEF7504B2}">
-  <ds:schemaRefs>
-    <ds:schemaRef ds:uri="ESRI.ArcGIS.Mapping.OfficeIntegration.PowerPointInfo"/>
-  </ds:schemaRefs>
-</ds:datastoreItem>
-</file>
-
-<file path=customXml/itemProps4.xml><?xml version="1.0" encoding="utf-8"?>
-<ds:datastoreItem xmlns:ds="http://schemas.openxmlformats.org/officeDocument/2006/customXml" ds:itemID="{4B0DBE6B-7B57-46AA-86E7-F9E97B743822}">
-  <ds:schemaRefs>
-    <ds:schemaRef ds:uri="ESRI.ArcGIS.Mapping.OfficeIntegration.PowerPointInfo"/>
-  </ds:schemaRefs>
-</ds:datastoreItem>
-</file>
-
-<file path=customXml/itemProps40.xml><?xml version="1.0" encoding="utf-8"?>
-<ds:datastoreItem xmlns:ds="http://schemas.openxmlformats.org/officeDocument/2006/customXml" ds:itemID="{31297315-62C1-4480-9C39-121F7B077A81}">
-  <ds:schemaRefs>
-    <ds:schemaRef ds:uri="ESRI.ArcGIS.Mapping.OfficeIntegration.PowerPointInfo"/>
-  </ds:schemaRefs>
-</ds:datastoreItem>
-</file>
-
-<file path=customXml/itemProps41.xml><?xml version="1.0" encoding="utf-8"?>
-<ds:datastoreItem xmlns:ds="http://schemas.openxmlformats.org/officeDocument/2006/customXml" ds:itemID="{ABCCEAD0-54AC-4D17-BA61-16A54F255D69}">
-  <ds:schemaRefs>
-    <ds:schemaRef ds:uri="ESRI.ArcGIS.Mapping.OfficeIntegration.PowerPointInfo"/>
-  </ds:schemaRefs>
-</ds:datastoreItem>
-</file>
-
-<file path=customXml/itemProps42.xml><?xml version="1.0" encoding="utf-8"?>
-<ds:datastoreItem xmlns:ds="http://schemas.openxmlformats.org/officeDocument/2006/customXml" ds:itemID="{99654EFC-576A-4551-A930-9AE30D2EFEBA}">
-  <ds:schemaRefs>
-    <ds:schemaRef ds:uri="ESRI.ArcGIS.Mapping.OfficeIntegration.PowerPointInfo"/>
-  </ds:schemaRefs>
-</ds:datastoreItem>
-</file>
-
-<file path=customXml/itemProps43.xml><?xml version="1.0" encoding="utf-8"?>
-<ds:datastoreItem xmlns:ds="http://schemas.openxmlformats.org/officeDocument/2006/customXml" ds:itemID="{52852150-2A24-4013-ACC6-201B4FA4AC9E}">
-  <ds:schemaRefs>
-    <ds:schemaRef ds:uri="ESRI.ArcGIS.Mapping.OfficeIntegration.PowerPointInfo"/>
-  </ds:schemaRefs>
-</ds:datastoreItem>
-</file>
-
-<file path=customXml/itemProps44.xml><?xml version="1.0" encoding="utf-8"?>
-<ds:datastoreItem xmlns:ds="http://schemas.openxmlformats.org/officeDocument/2006/customXml" ds:itemID="{F4718E52-05AF-4701-869C-7779E1869EA3}">
-  <ds:schemaRefs>
-    <ds:schemaRef ds:uri="ESRI.ArcGIS.Mapping.OfficeIntegration.PowerPointInfo"/>
-  </ds:schemaRefs>
-</ds:datastoreItem>
-</file>
-
-<file path=customXml/itemProps45.xml><?xml version="1.0" encoding="utf-8"?>
-<ds:datastoreItem xmlns:ds="http://schemas.openxmlformats.org/officeDocument/2006/customXml" ds:itemID="{3F6C67C9-9C0D-4369-A4E8-3BAA683EB06D}">
-  <ds:schemaRefs>
-    <ds:schemaRef ds:uri="ESRI.ArcGIS.Mapping.OfficeIntegration.PowerPointInfo"/>
-  </ds:schemaRefs>
-</ds:datastoreItem>
-</file>
-
-<file path=customXml/itemProps46.xml><?xml version="1.0" encoding="utf-8"?>
-<ds:datastoreItem xmlns:ds="http://schemas.openxmlformats.org/officeDocument/2006/customXml" ds:itemID="{646B6F9B-3300-4256-8FA0-A0D126A594D0}">
-  <ds:schemaRefs>
-    <ds:schemaRef ds:uri="ESRI.ArcGIS.Mapping.OfficeIntegration.PowerPointInfo"/>
-  </ds:schemaRefs>
-</ds:datastoreItem>
-</file>
-
-<file path=customXml/itemProps47.xml><?xml version="1.0" encoding="utf-8"?>
-<ds:datastoreItem xmlns:ds="http://schemas.openxmlformats.org/officeDocument/2006/customXml" ds:itemID="{A7920F8A-4663-43F1-8B16-11842AEE5A4F}">
-  <ds:schemaRefs>
-    <ds:schemaRef ds:uri="ESRI.ArcGIS.Mapping.OfficeIntegration.PowerPointInfo"/>
-  </ds:schemaRefs>
-</ds:datastoreItem>
-</file>
-
-<file path=customXml/itemProps48.xml><?xml version="1.0" encoding="utf-8"?>
-<ds:datastoreItem xmlns:ds="http://schemas.openxmlformats.org/officeDocument/2006/customXml" ds:itemID="{4D9F7826-2E0F-4037-B7DF-CFB4AF9F4DC5}">
-  <ds:schemaRefs>
-    <ds:schemaRef ds:uri="ESRI.ArcGIS.Mapping.OfficeIntegration.PowerPointInfo"/>
-  </ds:schemaRefs>
-</ds:datastoreItem>
-</file>
-
-<file path=customXml/itemProps49.xml><?xml version="1.0" encoding="utf-8"?>
-<ds:datastoreItem xmlns:ds="http://schemas.openxmlformats.org/officeDocument/2006/customXml" ds:itemID="{4379939E-B07C-46E0-9FD6-3FDDCB2AA2E8}">
-  <ds:schemaRefs>
-    <ds:schemaRef ds:uri="ESRI.ArcGIS.Mapping.OfficeIntegration.PowerPointInfo"/>
-  </ds:schemaRefs>
-</ds:datastoreItem>
-</file>
-
-<file path=customXml/itemProps5.xml><?xml version="1.0" encoding="utf-8"?>
-<ds:datastoreItem xmlns:ds="http://schemas.openxmlformats.org/officeDocument/2006/customXml" ds:itemID="{19817691-0170-4AF0-ACEC-0705752D0DBA}">
-  <ds:schemaRefs>
-    <ds:schemaRef ds:uri="ESRI.ArcGIS.Mapping.OfficeIntegration.PowerPointInfo"/>
-  </ds:schemaRefs>
-</ds:datastoreItem>
-</file>
-
-<file path=customXml/itemProps50.xml><?xml version="1.0" encoding="utf-8"?>
-<ds:datastoreItem xmlns:ds="http://schemas.openxmlformats.org/officeDocument/2006/customXml" ds:itemID="{7A3811F6-6BD7-49FD-BEDB-9C6E42B103BC}">
-  <ds:schemaRefs>
-    <ds:schemaRef ds:uri="ESRI.ArcGIS.Mapping.OfficeIntegration.PowerPointInfo"/>
-  </ds:schemaRefs>
-</ds:datastoreItem>
-</file>
-
-<file path=customXml/itemProps51.xml><?xml version="1.0" encoding="utf-8"?>
-<ds:datastoreItem xmlns:ds="http://schemas.openxmlformats.org/officeDocument/2006/customXml" ds:itemID="{BFB1D79A-7981-4359-A76F-E01A348DA2FA}">
-  <ds:schemaRefs>
-    <ds:schemaRef ds:uri="ESRI.ArcGIS.Mapping.OfficeIntegration.PowerPointInfo"/>
-  </ds:schemaRefs>
-</ds:datastoreItem>
-</file>
-
-<file path=customXml/itemProps52.xml><?xml version="1.0" encoding="utf-8"?>
-<ds:datastoreItem xmlns:ds="http://schemas.openxmlformats.org/officeDocument/2006/customXml" ds:itemID="{01407661-C13D-4BD9-A2A0-F2B94B44392F}">
-  <ds:schemaRefs>
-    <ds:schemaRef ds:uri="ESRI.ArcGIS.Mapping.OfficeIntegration.PowerPointInfo"/>
-  </ds:schemaRefs>
-</ds:datastoreItem>
-</file>
-
-<file path=customXml/itemProps53.xml><?xml version="1.0" encoding="utf-8"?>
-<ds:datastoreItem xmlns:ds="http://schemas.openxmlformats.org/officeDocument/2006/customXml" ds:itemID="{B4B3F56B-6212-4E4E-A69C-BAD9370C4D6C}">
-  <ds:schemaRefs>
-    <ds:schemaRef ds:uri="ESRI.ArcGIS.Mapping.OfficeIntegration.PowerPointInfo"/>
-  </ds:schemaRefs>
-</ds:datastoreItem>
-</file>
-
-<file path=customXml/itemProps54.xml><?xml version="1.0" encoding="utf-8"?>
-<ds:datastoreItem xmlns:ds="http://schemas.openxmlformats.org/officeDocument/2006/customXml" ds:itemID="{78353EAB-D2C8-42D7-B5D5-8E92AB06BD68}">
-  <ds:schemaRefs>
-    <ds:schemaRef ds:uri="ESRI.ArcGIS.Mapping.OfficeIntegration.PowerPointInfo"/>
-  </ds:schemaRefs>
-</ds:datastoreItem>
-</file>
-
-<file path=customXml/itemProps55.xml><?xml version="1.0" encoding="utf-8"?>
-<ds:datastoreItem xmlns:ds="http://schemas.openxmlformats.org/officeDocument/2006/customXml" ds:itemID="{ACFBDB26-86CD-4EC3-A5FC-95172352B52D}">
-  <ds:schemaRefs>
-    <ds:schemaRef ds:uri="ESRI.ArcGIS.Mapping.OfficeIntegration.PowerPointInfo"/>
-  </ds:schemaRefs>
-</ds:datastoreItem>
-</file>
-
-<file path=customXml/itemProps56.xml><?xml version="1.0" encoding="utf-8"?>
-<ds:datastoreItem xmlns:ds="http://schemas.openxmlformats.org/officeDocument/2006/customXml" ds:itemID="{8DC6FF56-73FA-4910-907B-F59E8164B000}">
-  <ds:schemaRefs>
-    <ds:schemaRef ds:uri="ESRI.ArcGIS.Mapping.OfficeIntegration.PowerPointInfo"/>
-  </ds:schemaRefs>
-</ds:datastoreItem>
-</file>
-
-<file path=customXml/itemProps57.xml><?xml version="1.0" encoding="utf-8"?>
-<ds:datastoreItem xmlns:ds="http://schemas.openxmlformats.org/officeDocument/2006/customXml" ds:itemID="{AC5386F8-3C91-4C94-9CC1-555F27CBDC6B}">
-  <ds:schemaRefs>
-    <ds:schemaRef ds:uri="ESRI.ArcGIS.Mapping.OfficeIntegration.PowerPointInfo"/>
-  </ds:schemaRefs>
-</ds:datastoreItem>
-</file>
-
-<file path=customXml/itemProps58.xml><?xml version="1.0" encoding="utf-8"?>
-<ds:datastoreItem xmlns:ds="http://schemas.openxmlformats.org/officeDocument/2006/customXml" ds:itemID="{8912BC99-414D-4FBF-A2E0-86F6F3C9B9C8}">
-  <ds:schemaRefs>
-    <ds:schemaRef ds:uri="ESRI.ArcGIS.Mapping.OfficeIntegration.PowerPointInfo"/>
-  </ds:schemaRefs>
-</ds:datastoreItem>
-</file>
-
-<file path=customXml/itemProps59.xml><?xml version="1.0" encoding="utf-8"?>
-<ds:datastoreItem xmlns:ds="http://schemas.openxmlformats.org/officeDocument/2006/customXml" ds:itemID="{38944470-50D2-4E98-94FB-28D3A3A94F26}">
-  <ds:schemaRefs>
-    <ds:schemaRef ds:uri="ESRI.ArcGIS.Mapping.OfficeIntegration.PowerPointInfo"/>
-  </ds:schemaRefs>
-</ds:datastoreItem>
-</file>
-
-<file path=customXml/itemProps6.xml><?xml version="1.0" encoding="utf-8"?>
-<ds:datastoreItem xmlns:ds="http://schemas.openxmlformats.org/officeDocument/2006/customXml" ds:itemID="{0E504B87-98A0-4527-8CFB-2899ADB5D8AE}">
-  <ds:schemaRefs>
-    <ds:schemaRef ds:uri="ESRI.ArcGIS.Mapping.OfficeIntegration.PowerPointInfo"/>
-  </ds:schemaRefs>
-</ds:datastoreItem>
-</file>
-
-<file path=customXml/itemProps60.xml><?xml version="1.0" encoding="utf-8"?>
+<file path=customXml/itemProps95.xml><?xml version="1.0" encoding="utf-8"?>
 <ds:datastoreItem xmlns:ds="http://schemas.openxmlformats.org/officeDocument/2006/customXml" ds:itemID="{3F8E7D0B-55D9-4FB7-950E-B45729F5DF40}">
   <ds:schemaRefs>
     <ds:schemaRef ds:uri="ESRI.ArcGIS.Mapping.OfficeIntegration.PowerPointInfo"/>
@@ -7379,314 +7801,10 @@
 </ds:datastoreItem>
 </file>
 
-<file path=customXml/itemProps61.xml><?xml version="1.0" encoding="utf-8"?>
-<ds:datastoreItem xmlns:ds="http://schemas.openxmlformats.org/officeDocument/2006/customXml" ds:itemID="{783692B3-F49B-48DF-A44F-01268B688908}">
-  <ds:schemaRefs>
-    <ds:schemaRef ds:uri="ESRI.ArcGIS.Mapping.OfficeIntegration.PowerPointInfo"/>
-  </ds:schemaRefs>
-</ds:datastoreItem>
-</file>
-
-<file path=customXml/itemProps62.xml><?xml version="1.0" encoding="utf-8"?>
-<ds:datastoreItem xmlns:ds="http://schemas.openxmlformats.org/officeDocument/2006/customXml" ds:itemID="{858D46F7-192E-4E2D-B592-4B1F3576BA1D}">
-  <ds:schemaRefs>
-    <ds:schemaRef ds:uri="ESRI.ArcGIS.Mapping.OfficeIntegration.PowerPointInfo"/>
-  </ds:schemaRefs>
-</ds:datastoreItem>
-</file>
-
-<file path=customXml/itemProps63.xml><?xml version="1.0" encoding="utf-8"?>
-<ds:datastoreItem xmlns:ds="http://schemas.openxmlformats.org/officeDocument/2006/customXml" ds:itemID="{EC8894B9-8141-48BE-9754-9ABD677C0C53}">
-  <ds:schemaRefs>
-    <ds:schemaRef ds:uri="ESRI.ArcGIS.Mapping.OfficeIntegration.PowerPointInfo"/>
-  </ds:schemaRefs>
-</ds:datastoreItem>
-</file>
-
-<file path=customXml/itemProps64.xml><?xml version="1.0" encoding="utf-8"?>
-<ds:datastoreItem xmlns:ds="http://schemas.openxmlformats.org/officeDocument/2006/customXml" ds:itemID="{56BFDDCC-5534-4ECE-84E8-E3E9914334AF}">
-  <ds:schemaRefs>
-    <ds:schemaRef ds:uri="ESRI.ArcGIS.Mapping.OfficeIntegration.PowerPointInfo"/>
-  </ds:schemaRefs>
-</ds:datastoreItem>
-</file>
-
-<file path=customXml/itemProps65.xml><?xml version="1.0" encoding="utf-8"?>
-<ds:datastoreItem xmlns:ds="http://schemas.openxmlformats.org/officeDocument/2006/customXml" ds:itemID="{DE0B804D-D3DA-41B8-A868-49FAF87763E2}">
-  <ds:schemaRefs>
-    <ds:schemaRef ds:uri="ESRI.ArcGIS.Mapping.OfficeIntegration.PowerPointInfo"/>
-  </ds:schemaRefs>
-</ds:datastoreItem>
-</file>
-
-<file path=customXml/itemProps66.xml><?xml version="1.0" encoding="utf-8"?>
-<ds:datastoreItem xmlns:ds="http://schemas.openxmlformats.org/officeDocument/2006/customXml" ds:itemID="{FDAC95F5-438D-4CBE-9FBB-7E8EEED9AA41}">
-  <ds:schemaRefs>
-    <ds:schemaRef ds:uri="ESRI.ArcGIS.Mapping.OfficeIntegration.PowerPointInfo"/>
-  </ds:schemaRefs>
-</ds:datastoreItem>
-</file>
-
-<file path=customXml/itemProps67.xml><?xml version="1.0" encoding="utf-8"?>
-<ds:datastoreItem xmlns:ds="http://schemas.openxmlformats.org/officeDocument/2006/customXml" ds:itemID="{AB51B998-B977-4E3E-B21B-958F6CE5DC84}">
-  <ds:schemaRefs>
-    <ds:schemaRef ds:uri="ESRI.ArcGIS.Mapping.OfficeIntegration.PowerPointInfo"/>
-  </ds:schemaRefs>
-</ds:datastoreItem>
-</file>
-
-<file path=customXml/itemProps68.xml><?xml version="1.0" encoding="utf-8"?>
-<ds:datastoreItem xmlns:ds="http://schemas.openxmlformats.org/officeDocument/2006/customXml" ds:itemID="{2A04FFEC-F060-4FAC-9569-F588C99AE08C}">
-  <ds:schemaRefs>
-    <ds:schemaRef ds:uri="ESRI.ArcGIS.Mapping.OfficeIntegration.PowerPointInfo"/>
-  </ds:schemaRefs>
-</ds:datastoreItem>
-</file>
-
-<file path=customXml/itemProps69.xml><?xml version="1.0" encoding="utf-8"?>
-<ds:datastoreItem xmlns:ds="http://schemas.openxmlformats.org/officeDocument/2006/customXml" ds:itemID="{FD6AF6B8-20AF-4256-AB02-C338175F1E0D}">
-  <ds:schemaRefs>
-    <ds:schemaRef ds:uri="ESRI.ArcGIS.Mapping.OfficeIntegration.PowerPointInfo"/>
-  </ds:schemaRefs>
-</ds:datastoreItem>
-</file>
-
-<file path=customXml/itemProps7.xml><?xml version="1.0" encoding="utf-8"?>
-<ds:datastoreItem xmlns:ds="http://schemas.openxmlformats.org/officeDocument/2006/customXml" ds:itemID="{32B3076B-EAE5-453F-81FC-455E4631880A}">
-  <ds:schemaRefs>
-    <ds:schemaRef ds:uri="ESRI.ArcGIS.Mapping.OfficeIntegration.PowerPointInfo"/>
-  </ds:schemaRefs>
-</ds:datastoreItem>
-</file>
-
-<file path=customXml/itemProps70.xml><?xml version="1.0" encoding="utf-8"?>
-<ds:datastoreItem xmlns:ds="http://schemas.openxmlformats.org/officeDocument/2006/customXml" ds:itemID="{3F4A5EA0-0FC9-40FA-8639-E086C8CA9090}">
-  <ds:schemaRefs>
-    <ds:schemaRef ds:uri="ESRI.ArcGIS.Mapping.OfficeIntegration.PowerPointInfo"/>
-  </ds:schemaRefs>
-</ds:datastoreItem>
-</file>
-
-<file path=customXml/itemProps71.xml><?xml version="1.0" encoding="utf-8"?>
-<ds:datastoreItem xmlns:ds="http://schemas.openxmlformats.org/officeDocument/2006/customXml" ds:itemID="{9EF54B68-B7DB-4B00-82E6-5C5A8D64BD6D}">
-  <ds:schemaRefs>
-    <ds:schemaRef ds:uri="ESRI.ArcGIS.Mapping.OfficeIntegration.PowerPointInfo"/>
-  </ds:schemaRefs>
-</ds:datastoreItem>
-</file>
-
-<file path=customXml/itemProps72.xml><?xml version="1.0" encoding="utf-8"?>
-<ds:datastoreItem xmlns:ds="http://schemas.openxmlformats.org/officeDocument/2006/customXml" ds:itemID="{B2FFE9F0-A341-4617-AEAC-12914E0FB453}">
-  <ds:schemaRefs>
-    <ds:schemaRef ds:uri="ESRI.ArcGIS.Mapping.OfficeIntegration.PowerPointInfo"/>
-  </ds:schemaRefs>
-</ds:datastoreItem>
-</file>
-
-<file path=customXml/itemProps73.xml><?xml version="1.0" encoding="utf-8"?>
-<ds:datastoreItem xmlns:ds="http://schemas.openxmlformats.org/officeDocument/2006/customXml" ds:itemID="{80DFB946-4516-4540-B473-E4506A73F7B1}">
-  <ds:schemaRefs>
-    <ds:schemaRef ds:uri="ESRI.ArcGIS.Mapping.OfficeIntegration.PowerPointInfo"/>
-  </ds:schemaRefs>
-</ds:datastoreItem>
-</file>
-
-<file path=customXml/itemProps74.xml><?xml version="1.0" encoding="utf-8"?>
-<ds:datastoreItem xmlns:ds="http://schemas.openxmlformats.org/officeDocument/2006/customXml" ds:itemID="{15DA27AF-4DCB-41FF-9C3F-91D327477E9D}">
-  <ds:schemaRefs>
-    <ds:schemaRef ds:uri="ESRI.ArcGIS.Mapping.OfficeIntegration.PowerPointInfo"/>
-  </ds:schemaRefs>
-</ds:datastoreItem>
-</file>
-
-<file path=customXml/itemProps75.xml><?xml version="1.0" encoding="utf-8"?>
-<ds:datastoreItem xmlns:ds="http://schemas.openxmlformats.org/officeDocument/2006/customXml" ds:itemID="{3B04F669-128B-4BDF-96F1-E5081EC03298}">
-  <ds:schemaRefs>
-    <ds:schemaRef ds:uri="ESRI.ArcGIS.Mapping.OfficeIntegration.PowerPointInfo"/>
-  </ds:schemaRefs>
-</ds:datastoreItem>
-</file>
-
-<file path=customXml/itemProps76.xml><?xml version="1.0" encoding="utf-8"?>
-<ds:datastoreItem xmlns:ds="http://schemas.openxmlformats.org/officeDocument/2006/customXml" ds:itemID="{EFEA9EBB-410F-46E7-963E-583DC45745E4}">
-  <ds:schemaRefs>
-    <ds:schemaRef ds:uri="ESRI.ArcGIS.Mapping.OfficeIntegration.PowerPointInfo"/>
-  </ds:schemaRefs>
-</ds:datastoreItem>
-</file>
-
-<file path=customXml/itemProps77.xml><?xml version="1.0" encoding="utf-8"?>
-<ds:datastoreItem xmlns:ds="http://schemas.openxmlformats.org/officeDocument/2006/customXml" ds:itemID="{E870EF71-F059-47A0-8084-ABCBA0F8957D}">
-  <ds:schemaRefs>
-    <ds:schemaRef ds:uri="ESRI.ArcGIS.Mapping.OfficeIntegration.PowerPointInfo"/>
-  </ds:schemaRefs>
-</ds:datastoreItem>
-</file>
-
-<file path=customXml/itemProps78.xml><?xml version="1.0" encoding="utf-8"?>
-<ds:datastoreItem xmlns:ds="http://schemas.openxmlformats.org/officeDocument/2006/customXml" ds:itemID="{A40B5D01-A378-4AE9-B186-D1A12D4CE2AA}">
-  <ds:schemaRefs>
-    <ds:schemaRef ds:uri="ESRI.ArcGIS.Mapping.OfficeIntegration.PowerPointInfo"/>
-  </ds:schemaRefs>
-</ds:datastoreItem>
-</file>
-
-<file path=customXml/itemProps79.xml><?xml version="1.0" encoding="utf-8"?>
-<ds:datastoreItem xmlns:ds="http://schemas.openxmlformats.org/officeDocument/2006/customXml" ds:itemID="{F8DCA1EA-A1EC-496C-A7B7-9ADA0274FC08}">
-  <ds:schemaRefs>
-    <ds:schemaRef ds:uri="ESRI.ArcGIS.Mapping.OfficeIntegration.PowerPointInfo"/>
-  </ds:schemaRefs>
-</ds:datastoreItem>
-</file>
-
-<file path=customXml/itemProps8.xml><?xml version="1.0" encoding="utf-8"?>
-<ds:datastoreItem xmlns:ds="http://schemas.openxmlformats.org/officeDocument/2006/customXml" ds:itemID="{CF823F5D-A21A-47E1-B3B5-F870C0CF4412}">
-  <ds:schemaRefs>
-    <ds:schemaRef ds:uri="ESRI.ArcGIS.Mapping.OfficeIntegration.PowerPointInfo"/>
-  </ds:schemaRefs>
-</ds:datastoreItem>
-</file>
-
-<file path=customXml/itemProps80.xml><?xml version="1.0" encoding="utf-8"?>
-<ds:datastoreItem xmlns:ds="http://schemas.openxmlformats.org/officeDocument/2006/customXml" ds:itemID="{90324B6F-A6E8-41EC-A38A-E8071ED047C6}">
-  <ds:schemaRefs>
-    <ds:schemaRef ds:uri="ESRI.ArcGIS.Mapping.OfficeIntegration.PowerPointInfo"/>
-  </ds:schemaRefs>
-</ds:datastoreItem>
-</file>
-
-<file path=customXml/itemProps81.xml><?xml version="1.0" encoding="utf-8"?>
-<ds:datastoreItem xmlns:ds="http://schemas.openxmlformats.org/officeDocument/2006/customXml" ds:itemID="{FDE65644-E4D0-4915-B68D-6BCB3FC898A0}">
-  <ds:schemaRefs>
-    <ds:schemaRef ds:uri="ESRI.ArcGIS.Mapping.OfficeIntegration.PowerPointInfo"/>
-  </ds:schemaRefs>
-</ds:datastoreItem>
-</file>
-
-<file path=customXml/itemProps82.xml><?xml version="1.0" encoding="utf-8"?>
-<ds:datastoreItem xmlns:ds="http://schemas.openxmlformats.org/officeDocument/2006/customXml" ds:itemID="{FFB4F6C3-1643-48A9-AE21-B5A1E8A4AEB0}">
-  <ds:schemaRefs>
-    <ds:schemaRef ds:uri="ESRI.ArcGIS.Mapping.OfficeIntegration.PowerPointInfo"/>
-  </ds:schemaRefs>
-</ds:datastoreItem>
-</file>
-
-<file path=customXml/itemProps83.xml><?xml version="1.0" encoding="utf-8"?>
-<ds:datastoreItem xmlns:ds="http://schemas.openxmlformats.org/officeDocument/2006/customXml" ds:itemID="{8404A4AE-BD08-4DE4-9709-8DC58122A84E}">
-  <ds:schemaRefs>
-    <ds:schemaRef ds:uri="ESRI.ArcGIS.Mapping.OfficeIntegration.PowerPointInfo"/>
-  </ds:schemaRefs>
-</ds:datastoreItem>
-</file>
-
-<file path=customXml/itemProps84.xml><?xml version="1.0" encoding="utf-8"?>
-<ds:datastoreItem xmlns:ds="http://schemas.openxmlformats.org/officeDocument/2006/customXml" ds:itemID="{EDD90020-1C1C-4DCB-8543-69D77F7C08FB}">
-  <ds:schemaRefs>
-    <ds:schemaRef ds:uri="ESRI.ArcGIS.Mapping.OfficeIntegration.PowerPointInfo"/>
-  </ds:schemaRefs>
-</ds:datastoreItem>
-</file>
-
-<file path=customXml/itemProps85.xml><?xml version="1.0" encoding="utf-8"?>
-<ds:datastoreItem xmlns:ds="http://schemas.openxmlformats.org/officeDocument/2006/customXml" ds:itemID="{B578D071-2CEF-4D6E-AA45-FCAB0C469A16}">
-  <ds:schemaRefs>
-    <ds:schemaRef ds:uri="ESRI.ArcGIS.Mapping.OfficeIntegration.PowerPointInfo"/>
-  </ds:schemaRefs>
-</ds:datastoreItem>
-</file>
-
-<file path=customXml/itemProps86.xml><?xml version="1.0" encoding="utf-8"?>
+<file path=customXml/itemProps96.xml><?xml version="1.0" encoding="utf-8"?>
 <ds:datastoreItem xmlns:ds="http://schemas.openxmlformats.org/officeDocument/2006/customXml" ds:itemID="{A773F67D-679C-4428-AB38-BB0B70159B4C}">
   <ds:schemaRefs>
     <ds:schemaRef ds:uri="ESRI.ArcGIS.Mapping.OfficeIntegration.PowerPointInfo"/>
   </ds:schemaRefs>
 </ds:datastoreItem>
-</file>
-
-<file path=customXml/itemProps87.xml><?xml version="1.0" encoding="utf-8"?>
-<ds:datastoreItem xmlns:ds="http://schemas.openxmlformats.org/officeDocument/2006/customXml" ds:itemID="{814125C8-3A61-4145-B950-99BA7873FE67}">
-  <ds:schemaRefs>
-    <ds:schemaRef ds:uri="ESRI.ArcGIS.Mapping.OfficeIntegration.PowerPointInfo"/>
-  </ds:schemaRefs>
-</ds:datastoreItem>
-</file>
-
-<file path=customXml/itemProps88.xml><?xml version="1.0" encoding="utf-8"?>
-<ds:datastoreItem xmlns:ds="http://schemas.openxmlformats.org/officeDocument/2006/customXml" ds:itemID="{9E9D7983-8A78-4FD8-9A61-A6F7E1C78D21}">
-  <ds:schemaRefs>
-    <ds:schemaRef ds:uri="ESRI.ArcGIS.Mapping.OfficeIntegration.PowerPointInfo"/>
-  </ds:schemaRefs>
-</ds:datastoreItem>
-</file>
-
-<file path=customXml/itemProps89.xml><?xml version="1.0" encoding="utf-8"?>
-<ds:datastoreItem xmlns:ds="http://schemas.openxmlformats.org/officeDocument/2006/customXml" ds:itemID="{B297B785-E6A8-4387-B4A9-E2724F4A130E}">
-  <ds:schemaRefs>
-    <ds:schemaRef ds:uri="ESRI.ArcGIS.Mapping.OfficeIntegration.PowerPointInfo"/>
-  </ds:schemaRefs>
-</ds:datastoreItem>
-</file>
-
-<file path=customXml/itemProps9.xml><?xml version="1.0" encoding="utf-8"?>
-<ds:datastoreItem xmlns:ds="http://schemas.openxmlformats.org/officeDocument/2006/customXml" ds:itemID="{7233A7FC-5157-4E99-8ADB-E04C97CA43F9}">
-  <ds:schemaRefs>
-    <ds:schemaRef ds:uri="ESRI.ArcGIS.Mapping.OfficeIntegration.PowerPointInfo"/>
-  </ds:schemaRefs>
-</ds:datastoreItem>
-</file>
-
-<file path=customXml/itemProps90.xml><?xml version="1.0" encoding="utf-8"?>
-<ds:datastoreItem xmlns:ds="http://schemas.openxmlformats.org/officeDocument/2006/customXml" ds:itemID="{5C0B39C0-1E0C-44E9-8E23-EBDF7BBC46EB}">
-  <ds:schemaRefs>
-    <ds:schemaRef ds:uri="ESRI.ArcGIS.Mapping.OfficeIntegration.PowerPointInfo"/>
-  </ds:schemaRefs>
-</ds:datastoreItem>
-</file>
-
-<file path=customXml/itemProps91.xml><?xml version="1.0" encoding="utf-8"?>
-<ds:datastoreItem xmlns:ds="http://schemas.openxmlformats.org/officeDocument/2006/customXml" ds:itemID="{35CCF644-4BDF-4974-8CF2-2D51276EE878}">
-  <ds:schemaRefs>
-    <ds:schemaRef ds:uri="ESRI.ArcGIS.Mapping.OfficeIntegration.PowerPointInfo"/>
-  </ds:schemaRefs>
-</ds:datastoreItem>
-</file>
-
-<file path=customXml/itemProps92.xml><?xml version="1.0" encoding="utf-8"?>
-<ds:datastoreItem xmlns:ds="http://schemas.openxmlformats.org/officeDocument/2006/customXml" ds:itemID="{BBB647FA-E060-4096-BBC8-453ED8E31741}">
-  <ds:schemaRefs>
-    <ds:schemaRef ds:uri="ESRI.ArcGIS.Mapping.OfficeIntegration.PowerPointInfo"/>
-  </ds:schemaRefs>
-</ds:datastoreItem>
-</file>
-
-<file path=customXml/itemProps93.xml><?xml version="1.0" encoding="utf-8"?>
-<ds:datastoreItem xmlns:ds="http://schemas.openxmlformats.org/officeDocument/2006/customXml" ds:itemID="{2B63EAEA-ACD7-4ABA-A376-4D8FE1692226}">
-  <ds:schemaRefs>
-    <ds:schemaRef ds:uri="ESRI.ArcGIS.Mapping.OfficeIntegration.PowerPointInfo"/>
-  </ds:schemaRefs>
-</ds:datastoreItem>
-</file>
-
-<file path=customXml/itemProps94.xml><?xml version="1.0" encoding="utf-8"?>
-<ds:datastoreItem xmlns:ds="http://schemas.openxmlformats.org/officeDocument/2006/customXml" ds:itemID="{0B1D3F49-B805-42B7-B826-4C796D9E3E8A}">
-  <ds:schemaRefs>
-    <ds:schemaRef ds:uri="ESRI.ArcGIS.Mapping.OfficeIntegration.PowerPointInfo"/>
-  </ds:schemaRefs>
-</ds:datastoreItem>
-</file>
-
-<file path=customXml/itemProps95.xml><?xml version="1.0" encoding="utf-8"?>
-<ds:datastoreItem xmlns:ds="http://schemas.openxmlformats.org/officeDocument/2006/customXml" ds:itemID="{D9B47B32-4473-4F1D-9AB4-D1DD38E327B5}">
-  <ds:schemaRefs>
-    <ds:schemaRef ds:uri="ESRI.ArcGIS.Mapping.OfficeIntegration.PowerPointInfo"/>
-  </ds:schemaRefs>
-</ds:datastoreItem>
-</file>
-
-<file path=customXml/itemProps96.xml><?xml version="1.0" encoding="utf-8"?>
-<ds:datastoreItem xmlns:ds="http://schemas.openxmlformats.org/officeDocument/2006/customXml" ds:itemID="{5E79A1E8-26E5-4724-87CE-CF963D07CCCB}">
-  <ds:schemaRefs>
-    <ds:schemaRef ds:uri="ESRI.ArcGIS.Mapping.OfficeIntegration.PowerPointInfo"/>
-  </ds:schemaRefs>
-</ds:datastoreItem>
 </file>
</xml_diff>